<commit_message>
Initial commit of products-service, no auth
</commit_message>
<xml_diff>
--- a/docs/mini-shopee.pptx
+++ b/docs/mini-shopee.pptx
@@ -4,6 +4,9 @@
   <p:sldMasterIdLst>
     <p:sldMasterId id="2147483648" r:id="rId1"/>
   </p:sldMasterIdLst>
+  <p:notesMasterIdLst>
+    <p:notesMasterId r:id="rId4"/>
+  </p:notesMasterIdLst>
   <p:sldIdLst>
     <p:sldId id="256" r:id="rId2"/>
     <p:sldId id="257" r:id="rId3"/>
@@ -113,6 +116,449 @@
 </p:presentation>
 </file>
 
+<file path=ppt/notesMasters/notesMaster1.xml><?xml version="1.0" encoding="utf-8"?>
+<p:notesMaster xmlns:a="http://schemas.openxmlformats.org/drawingml/2006/main" xmlns:r="http://schemas.openxmlformats.org/officeDocument/2006/relationships" xmlns:p="http://schemas.openxmlformats.org/presentationml/2006/main">
+  <p:cSld>
+    <p:bg>
+      <p:bgRef idx="1001">
+        <a:schemeClr val="bg1"/>
+      </p:bgRef>
+    </p:bg>
+    <p:spTree>
+      <p:nvGrpSpPr>
+        <p:cNvPr id="1" name=""/>
+        <p:cNvGrpSpPr/>
+        <p:nvPr/>
+      </p:nvGrpSpPr>
+      <p:grpSpPr>
+        <a:xfrm>
+          <a:off x="0" y="0"/>
+          <a:ext cx="0" cy="0"/>
+          <a:chOff x="0" y="0"/>
+          <a:chExt cx="0" cy="0"/>
+        </a:xfrm>
+      </p:grpSpPr>
+      <p:sp>
+        <p:nvSpPr>
+          <p:cNvPr id="2" name="Header Placeholder 1"/>
+          <p:cNvSpPr>
+            <a:spLocks noGrp="1"/>
+          </p:cNvSpPr>
+          <p:nvPr>
+            <p:ph type="hdr" sz="quarter"/>
+          </p:nvPr>
+        </p:nvSpPr>
+        <p:spPr>
+          <a:xfrm>
+            <a:off x="0" y="0"/>
+            <a:ext cx="2971800" cy="458788"/>
+          </a:xfrm>
+          <a:prstGeom prst="rect">
+            <a:avLst/>
+          </a:prstGeom>
+        </p:spPr>
+        <p:txBody>
+          <a:bodyPr vert="horz" lIns="91440" tIns="45720" rIns="91440" bIns="45720" rtlCol="0"/>
+          <a:lstStyle>
+            <a:lvl1pPr algn="l">
+              <a:defRPr sz="1200"/>
+            </a:lvl1pPr>
+          </a:lstStyle>
+          <a:p>
+            <a:endParaRPr lang="en-SG"/>
+          </a:p>
+        </p:txBody>
+      </p:sp>
+      <p:sp>
+        <p:nvSpPr>
+          <p:cNvPr id="3" name="Date Placeholder 2"/>
+          <p:cNvSpPr>
+            <a:spLocks noGrp="1"/>
+          </p:cNvSpPr>
+          <p:nvPr>
+            <p:ph type="dt" idx="1"/>
+          </p:nvPr>
+        </p:nvSpPr>
+        <p:spPr>
+          <a:xfrm>
+            <a:off x="3884613" y="0"/>
+            <a:ext cx="2971800" cy="458788"/>
+          </a:xfrm>
+          <a:prstGeom prst="rect">
+            <a:avLst/>
+          </a:prstGeom>
+        </p:spPr>
+        <p:txBody>
+          <a:bodyPr vert="horz" lIns="91440" tIns="45720" rIns="91440" bIns="45720" rtlCol="0"/>
+          <a:lstStyle>
+            <a:lvl1pPr algn="r">
+              <a:defRPr sz="1200"/>
+            </a:lvl1pPr>
+          </a:lstStyle>
+          <a:p>
+            <a:fld id="{79B65053-AE6D-47D5-A384-D8086C420E28}" type="datetimeFigureOut">
+              <a:rPr lang="en-SG" smtClean="0"/>
+              <a:t>4/4/2021</a:t>
+            </a:fld>
+            <a:endParaRPr lang="en-SG"/>
+          </a:p>
+        </p:txBody>
+      </p:sp>
+      <p:sp>
+        <p:nvSpPr>
+          <p:cNvPr id="4" name="Slide Image Placeholder 3"/>
+          <p:cNvSpPr>
+            <a:spLocks noGrp="1" noRot="1" noChangeAspect="1"/>
+          </p:cNvSpPr>
+          <p:nvPr>
+            <p:ph type="sldImg" idx="2"/>
+          </p:nvPr>
+        </p:nvSpPr>
+        <p:spPr>
+          <a:xfrm>
+            <a:off x="685800" y="1143000"/>
+            <a:ext cx="5486400" cy="3086100"/>
+          </a:xfrm>
+          <a:prstGeom prst="rect">
+            <a:avLst/>
+          </a:prstGeom>
+          <a:noFill/>
+          <a:ln w="12700">
+            <a:solidFill>
+              <a:prstClr val="black"/>
+            </a:solidFill>
+          </a:ln>
+        </p:spPr>
+        <p:txBody>
+          <a:bodyPr vert="horz" lIns="91440" tIns="45720" rIns="91440" bIns="45720" rtlCol="0" anchor="ctr"/>
+          <a:lstStyle/>
+          <a:p>
+            <a:endParaRPr lang="en-SG"/>
+          </a:p>
+        </p:txBody>
+      </p:sp>
+      <p:sp>
+        <p:nvSpPr>
+          <p:cNvPr id="5" name="Notes Placeholder 4"/>
+          <p:cNvSpPr>
+            <a:spLocks noGrp="1"/>
+          </p:cNvSpPr>
+          <p:nvPr>
+            <p:ph type="body" sz="quarter" idx="3"/>
+          </p:nvPr>
+        </p:nvSpPr>
+        <p:spPr>
+          <a:xfrm>
+            <a:off x="685800" y="4400550"/>
+            <a:ext cx="5486400" cy="3600450"/>
+          </a:xfrm>
+          <a:prstGeom prst="rect">
+            <a:avLst/>
+          </a:prstGeom>
+        </p:spPr>
+        <p:txBody>
+          <a:bodyPr vert="horz" lIns="91440" tIns="45720" rIns="91440" bIns="45720" rtlCol="0"/>
+          <a:lstStyle/>
+          <a:p>
+            <a:pPr lvl="0"/>
+            <a:r>
+              <a:rPr lang="en-US"/>
+              <a:t>Click to edit Master text styles</a:t>
+            </a:r>
+          </a:p>
+          <a:p>
+            <a:pPr lvl="1"/>
+            <a:r>
+              <a:rPr lang="en-US"/>
+              <a:t>Second level</a:t>
+            </a:r>
+          </a:p>
+          <a:p>
+            <a:pPr lvl="2"/>
+            <a:r>
+              <a:rPr lang="en-US"/>
+              <a:t>Third level</a:t>
+            </a:r>
+          </a:p>
+          <a:p>
+            <a:pPr lvl="3"/>
+            <a:r>
+              <a:rPr lang="en-US"/>
+              <a:t>Fourth level</a:t>
+            </a:r>
+          </a:p>
+          <a:p>
+            <a:pPr lvl="4"/>
+            <a:r>
+              <a:rPr lang="en-US"/>
+              <a:t>Fifth level</a:t>
+            </a:r>
+            <a:endParaRPr lang="en-SG"/>
+          </a:p>
+        </p:txBody>
+      </p:sp>
+      <p:sp>
+        <p:nvSpPr>
+          <p:cNvPr id="6" name="Footer Placeholder 5"/>
+          <p:cNvSpPr>
+            <a:spLocks noGrp="1"/>
+          </p:cNvSpPr>
+          <p:nvPr>
+            <p:ph type="ftr" sz="quarter" idx="4"/>
+          </p:nvPr>
+        </p:nvSpPr>
+        <p:spPr>
+          <a:xfrm>
+            <a:off x="0" y="8685213"/>
+            <a:ext cx="2971800" cy="458787"/>
+          </a:xfrm>
+          <a:prstGeom prst="rect">
+            <a:avLst/>
+          </a:prstGeom>
+        </p:spPr>
+        <p:txBody>
+          <a:bodyPr vert="horz" lIns="91440" tIns="45720" rIns="91440" bIns="45720" rtlCol="0" anchor="b"/>
+          <a:lstStyle>
+            <a:lvl1pPr algn="l">
+              <a:defRPr sz="1200"/>
+            </a:lvl1pPr>
+          </a:lstStyle>
+          <a:p>
+            <a:endParaRPr lang="en-SG"/>
+          </a:p>
+        </p:txBody>
+      </p:sp>
+      <p:sp>
+        <p:nvSpPr>
+          <p:cNvPr id="7" name="Slide Number Placeholder 6"/>
+          <p:cNvSpPr>
+            <a:spLocks noGrp="1"/>
+          </p:cNvSpPr>
+          <p:nvPr>
+            <p:ph type="sldNum" sz="quarter" idx="5"/>
+          </p:nvPr>
+        </p:nvSpPr>
+        <p:spPr>
+          <a:xfrm>
+            <a:off x="3884613" y="8685213"/>
+            <a:ext cx="2971800" cy="458787"/>
+          </a:xfrm>
+          <a:prstGeom prst="rect">
+            <a:avLst/>
+          </a:prstGeom>
+        </p:spPr>
+        <p:txBody>
+          <a:bodyPr vert="horz" lIns="91440" tIns="45720" rIns="91440" bIns="45720" rtlCol="0" anchor="b"/>
+          <a:lstStyle>
+            <a:lvl1pPr algn="r">
+              <a:defRPr sz="1200"/>
+            </a:lvl1pPr>
+          </a:lstStyle>
+          <a:p>
+            <a:fld id="{1D0069F1-02AE-4770-8223-0B6814907FAD}" type="slidenum">
+              <a:rPr lang="en-SG" smtClean="0"/>
+              <a:t>‹#›</a:t>
+            </a:fld>
+            <a:endParaRPr lang="en-SG"/>
+          </a:p>
+        </p:txBody>
+      </p:sp>
+    </p:spTree>
+    <p:extLst>
+      <p:ext uri="{BB962C8B-B14F-4D97-AF65-F5344CB8AC3E}">
+        <p14:creationId xmlns:p14="http://schemas.microsoft.com/office/powerpoint/2010/main" val="3579117648"/>
+      </p:ext>
+    </p:extLst>
+  </p:cSld>
+  <p:clrMap bg1="lt1" tx1="dk1" bg2="lt2" tx2="dk2" accent1="accent1" accent2="accent2" accent3="accent3" accent4="accent4" accent5="accent5" accent6="accent6" hlink="hlink" folHlink="folHlink"/>
+  <p:notesStyle>
+    <a:lvl1pPr marL="0" algn="l" defTabSz="914400" rtl="0" eaLnBrk="1" latinLnBrk="0" hangingPunct="1">
+      <a:defRPr sz="1200" kern="1200">
+        <a:solidFill>
+          <a:schemeClr val="tx1"/>
+        </a:solidFill>
+        <a:latin typeface="+mn-lt"/>
+        <a:ea typeface="+mn-ea"/>
+        <a:cs typeface="+mn-cs"/>
+      </a:defRPr>
+    </a:lvl1pPr>
+    <a:lvl2pPr marL="457200" algn="l" defTabSz="914400" rtl="0" eaLnBrk="1" latinLnBrk="0" hangingPunct="1">
+      <a:defRPr sz="1200" kern="1200">
+        <a:solidFill>
+          <a:schemeClr val="tx1"/>
+        </a:solidFill>
+        <a:latin typeface="+mn-lt"/>
+        <a:ea typeface="+mn-ea"/>
+        <a:cs typeface="+mn-cs"/>
+      </a:defRPr>
+    </a:lvl2pPr>
+    <a:lvl3pPr marL="914400" algn="l" defTabSz="914400" rtl="0" eaLnBrk="1" latinLnBrk="0" hangingPunct="1">
+      <a:defRPr sz="1200" kern="1200">
+        <a:solidFill>
+          <a:schemeClr val="tx1"/>
+        </a:solidFill>
+        <a:latin typeface="+mn-lt"/>
+        <a:ea typeface="+mn-ea"/>
+        <a:cs typeface="+mn-cs"/>
+      </a:defRPr>
+    </a:lvl3pPr>
+    <a:lvl4pPr marL="1371600" algn="l" defTabSz="914400" rtl="0" eaLnBrk="1" latinLnBrk="0" hangingPunct="1">
+      <a:defRPr sz="1200" kern="1200">
+        <a:solidFill>
+          <a:schemeClr val="tx1"/>
+        </a:solidFill>
+        <a:latin typeface="+mn-lt"/>
+        <a:ea typeface="+mn-ea"/>
+        <a:cs typeface="+mn-cs"/>
+      </a:defRPr>
+    </a:lvl4pPr>
+    <a:lvl5pPr marL="1828800" algn="l" defTabSz="914400" rtl="0" eaLnBrk="1" latinLnBrk="0" hangingPunct="1">
+      <a:defRPr sz="1200" kern="1200">
+        <a:solidFill>
+          <a:schemeClr val="tx1"/>
+        </a:solidFill>
+        <a:latin typeface="+mn-lt"/>
+        <a:ea typeface="+mn-ea"/>
+        <a:cs typeface="+mn-cs"/>
+      </a:defRPr>
+    </a:lvl5pPr>
+    <a:lvl6pPr marL="2286000" algn="l" defTabSz="914400" rtl="0" eaLnBrk="1" latinLnBrk="0" hangingPunct="1">
+      <a:defRPr sz="1200" kern="1200">
+        <a:solidFill>
+          <a:schemeClr val="tx1"/>
+        </a:solidFill>
+        <a:latin typeface="+mn-lt"/>
+        <a:ea typeface="+mn-ea"/>
+        <a:cs typeface="+mn-cs"/>
+      </a:defRPr>
+    </a:lvl6pPr>
+    <a:lvl7pPr marL="2743200" algn="l" defTabSz="914400" rtl="0" eaLnBrk="1" latinLnBrk="0" hangingPunct="1">
+      <a:defRPr sz="1200" kern="1200">
+        <a:solidFill>
+          <a:schemeClr val="tx1"/>
+        </a:solidFill>
+        <a:latin typeface="+mn-lt"/>
+        <a:ea typeface="+mn-ea"/>
+        <a:cs typeface="+mn-cs"/>
+      </a:defRPr>
+    </a:lvl7pPr>
+    <a:lvl8pPr marL="3200400" algn="l" defTabSz="914400" rtl="0" eaLnBrk="1" latinLnBrk="0" hangingPunct="1">
+      <a:defRPr sz="1200" kern="1200">
+        <a:solidFill>
+          <a:schemeClr val="tx1"/>
+        </a:solidFill>
+        <a:latin typeface="+mn-lt"/>
+        <a:ea typeface="+mn-ea"/>
+        <a:cs typeface="+mn-cs"/>
+      </a:defRPr>
+    </a:lvl8pPr>
+    <a:lvl9pPr marL="3657600" algn="l" defTabSz="914400" rtl="0" eaLnBrk="1" latinLnBrk="0" hangingPunct="1">
+      <a:defRPr sz="1200" kern="1200">
+        <a:solidFill>
+          <a:schemeClr val="tx1"/>
+        </a:solidFill>
+        <a:latin typeface="+mn-lt"/>
+        <a:ea typeface="+mn-ea"/>
+        <a:cs typeface="+mn-cs"/>
+      </a:defRPr>
+    </a:lvl9pPr>
+  </p:notesStyle>
+</p:notesMaster>
+</file>
+
+<file path=ppt/notesSlides/notesSlide1.xml><?xml version="1.0" encoding="utf-8"?>
+<p:notes xmlns:a="http://schemas.openxmlformats.org/drawingml/2006/main" xmlns:r="http://schemas.openxmlformats.org/officeDocument/2006/relationships" xmlns:p="http://schemas.openxmlformats.org/presentationml/2006/main">
+  <p:cSld>
+    <p:spTree>
+      <p:nvGrpSpPr>
+        <p:cNvPr id="1" name=""/>
+        <p:cNvGrpSpPr/>
+        <p:nvPr/>
+      </p:nvGrpSpPr>
+      <p:grpSpPr>
+        <a:xfrm>
+          <a:off x="0" y="0"/>
+          <a:ext cx="0" cy="0"/>
+          <a:chOff x="0" y="0"/>
+          <a:chExt cx="0" cy="0"/>
+        </a:xfrm>
+      </p:grpSpPr>
+      <p:sp>
+        <p:nvSpPr>
+          <p:cNvPr id="2" name="Slide Image Placeholder 1"/>
+          <p:cNvSpPr>
+            <a:spLocks noGrp="1" noRot="1" noChangeAspect="1"/>
+          </p:cNvSpPr>
+          <p:nvPr>
+            <p:ph type="sldImg"/>
+          </p:nvPr>
+        </p:nvSpPr>
+        <p:spPr/>
+      </p:sp>
+      <p:sp>
+        <p:nvSpPr>
+          <p:cNvPr id="3" name="Notes Placeholder 2"/>
+          <p:cNvSpPr>
+            <a:spLocks noGrp="1"/>
+          </p:cNvSpPr>
+          <p:nvPr>
+            <p:ph type="body" idx="1"/>
+          </p:nvPr>
+        </p:nvSpPr>
+        <p:spPr/>
+        <p:txBody>
+          <a:bodyPr/>
+          <a:lstStyle/>
+          <a:p>
+            <a:r>
+              <a:rPr lang="en-SG" dirty="0"/>
+              <a:t>Other services</a:t>
+            </a:r>
+          </a:p>
+          <a:p>
+            <a:r>
+              <a:rPr lang="en-SG" dirty="0"/>
+              <a:t>- Customer Reviews</a:t>
+            </a:r>
+          </a:p>
+        </p:txBody>
+      </p:sp>
+      <p:sp>
+        <p:nvSpPr>
+          <p:cNvPr id="4" name="Slide Number Placeholder 3"/>
+          <p:cNvSpPr>
+            <a:spLocks noGrp="1"/>
+          </p:cNvSpPr>
+          <p:nvPr>
+            <p:ph type="sldNum" sz="quarter" idx="5"/>
+          </p:nvPr>
+        </p:nvSpPr>
+        <p:spPr/>
+        <p:txBody>
+          <a:bodyPr/>
+          <a:lstStyle/>
+          <a:p>
+            <a:fld id="{1D0069F1-02AE-4770-8223-0B6814907FAD}" type="slidenum">
+              <a:rPr lang="en-SG" smtClean="0"/>
+              <a:t>1</a:t>
+            </a:fld>
+            <a:endParaRPr lang="en-SG"/>
+          </a:p>
+        </p:txBody>
+      </p:sp>
+    </p:spTree>
+    <p:extLst>
+      <p:ext uri="{BB962C8B-B14F-4D97-AF65-F5344CB8AC3E}">
+        <p14:creationId xmlns:p14="http://schemas.microsoft.com/office/powerpoint/2010/main" val="1244934053"/>
+      </p:ext>
+    </p:extLst>
+  </p:cSld>
+  <p:clrMapOvr>
+    <a:masterClrMapping/>
+  </p:clrMapOvr>
+</p:notes>
+</file>
+
 <file path=ppt/slideLayouts/slideLayout1.xml><?xml version="1.0" encoding="utf-8"?>
 <p:sldLayout xmlns:a="http://schemas.openxmlformats.org/drawingml/2006/main" xmlns:r="http://schemas.openxmlformats.org/officeDocument/2006/relationships" xmlns:p="http://schemas.openxmlformats.org/presentationml/2006/main" type="title" preserve="1">
   <p:cSld name="Title Slide">
@@ -262,7 +708,7 @@
           <a:p>
             <a:fld id="{88C71A5F-BDD3-4AA1-A763-C2448EF4901C}" type="datetimeFigureOut">
               <a:rPr lang="en-SG" smtClean="0"/>
-              <a:t>25/3/2021</a:t>
+              <a:t>4/4/2021</a:t>
             </a:fld>
             <a:endParaRPr lang="en-SG"/>
           </a:p>
@@ -462,7 +908,7 @@
           <a:p>
             <a:fld id="{88C71A5F-BDD3-4AA1-A763-C2448EF4901C}" type="datetimeFigureOut">
               <a:rPr lang="en-SG" smtClean="0"/>
-              <a:t>25/3/2021</a:t>
+              <a:t>4/4/2021</a:t>
             </a:fld>
             <a:endParaRPr lang="en-SG"/>
           </a:p>
@@ -672,7 +1118,7 @@
           <a:p>
             <a:fld id="{88C71A5F-BDD3-4AA1-A763-C2448EF4901C}" type="datetimeFigureOut">
               <a:rPr lang="en-SG" smtClean="0"/>
-              <a:t>25/3/2021</a:t>
+              <a:t>4/4/2021</a:t>
             </a:fld>
             <a:endParaRPr lang="en-SG"/>
           </a:p>
@@ -872,7 +1318,7 @@
           <a:p>
             <a:fld id="{88C71A5F-BDD3-4AA1-A763-C2448EF4901C}" type="datetimeFigureOut">
               <a:rPr lang="en-SG" smtClean="0"/>
-              <a:t>25/3/2021</a:t>
+              <a:t>4/4/2021</a:t>
             </a:fld>
             <a:endParaRPr lang="en-SG"/>
           </a:p>
@@ -1148,7 +1594,7 @@
           <a:p>
             <a:fld id="{88C71A5F-BDD3-4AA1-A763-C2448EF4901C}" type="datetimeFigureOut">
               <a:rPr lang="en-SG" smtClean="0"/>
-              <a:t>25/3/2021</a:t>
+              <a:t>4/4/2021</a:t>
             </a:fld>
             <a:endParaRPr lang="en-SG"/>
           </a:p>
@@ -1416,7 +1862,7 @@
           <a:p>
             <a:fld id="{88C71A5F-BDD3-4AA1-A763-C2448EF4901C}" type="datetimeFigureOut">
               <a:rPr lang="en-SG" smtClean="0"/>
-              <a:t>25/3/2021</a:t>
+              <a:t>4/4/2021</a:t>
             </a:fld>
             <a:endParaRPr lang="en-SG"/>
           </a:p>
@@ -1831,7 +2277,7 @@
           <a:p>
             <a:fld id="{88C71A5F-BDD3-4AA1-A763-C2448EF4901C}" type="datetimeFigureOut">
               <a:rPr lang="en-SG" smtClean="0"/>
-              <a:t>25/3/2021</a:t>
+              <a:t>4/4/2021</a:t>
             </a:fld>
             <a:endParaRPr lang="en-SG"/>
           </a:p>
@@ -1973,7 +2419,7 @@
           <a:p>
             <a:fld id="{88C71A5F-BDD3-4AA1-A763-C2448EF4901C}" type="datetimeFigureOut">
               <a:rPr lang="en-SG" smtClean="0"/>
-              <a:t>25/3/2021</a:t>
+              <a:t>4/4/2021</a:t>
             </a:fld>
             <a:endParaRPr lang="en-SG"/>
           </a:p>
@@ -2086,7 +2532,7 @@
           <a:p>
             <a:fld id="{88C71A5F-BDD3-4AA1-A763-C2448EF4901C}" type="datetimeFigureOut">
               <a:rPr lang="en-SG" smtClean="0"/>
-              <a:t>25/3/2021</a:t>
+              <a:t>4/4/2021</a:t>
             </a:fld>
             <a:endParaRPr lang="en-SG"/>
           </a:p>
@@ -2399,7 +2845,7 @@
           <a:p>
             <a:fld id="{88C71A5F-BDD3-4AA1-A763-C2448EF4901C}" type="datetimeFigureOut">
               <a:rPr lang="en-SG" smtClean="0"/>
-              <a:t>25/3/2021</a:t>
+              <a:t>4/4/2021</a:t>
             </a:fld>
             <a:endParaRPr lang="en-SG"/>
           </a:p>
@@ -2688,7 +3134,7 @@
           <a:p>
             <a:fld id="{88C71A5F-BDD3-4AA1-A763-C2448EF4901C}" type="datetimeFigureOut">
               <a:rPr lang="en-SG" smtClean="0"/>
-              <a:t>25/3/2021</a:t>
+              <a:t>4/4/2021</a:t>
             </a:fld>
             <a:endParaRPr lang="en-SG"/>
           </a:p>
@@ -2931,7 +3377,7 @@
           <a:p>
             <a:fld id="{88C71A5F-BDD3-4AA1-A763-C2448EF4901C}" type="datetimeFigureOut">
               <a:rPr lang="en-SG" smtClean="0"/>
-              <a:t>25/3/2021</a:t>
+              <a:t>4/4/2021</a:t>
             </a:fld>
             <a:endParaRPr lang="en-SG"/>
           </a:p>
@@ -3362,7 +3808,7 @@
         </p:nvSpPr>
         <p:spPr>
           <a:xfrm>
-            <a:off x="6165541" y="852255"/>
+            <a:off x="5574991" y="661755"/>
             <a:ext cx="2059619" cy="701336"/>
           </a:xfrm>
           <a:prstGeom prst="rect">
@@ -3409,6 +3855,14 @@
               <a:t>Auth Service</a:t>
             </a:r>
           </a:p>
+          <a:p>
+            <a:pPr algn="ctr"/>
+            <a:endParaRPr lang="en-SG" dirty="0">
+              <a:solidFill>
+                <a:schemeClr val="tx1"/>
+              </a:solidFill>
+            </a:endParaRPr>
+          </a:p>
         </p:txBody>
       </p:sp>
       <p:sp>
@@ -3425,7 +3879,7 @@
         </p:nvSpPr>
         <p:spPr>
           <a:xfrm>
-            <a:off x="6189215" y="1965293"/>
+            <a:off x="5598665" y="1774793"/>
             <a:ext cx="2059619" cy="701336"/>
           </a:xfrm>
           <a:prstGeom prst="rect">
@@ -3472,6 +3926,14 @@
               <a:t>Config Service</a:t>
             </a:r>
           </a:p>
+          <a:p>
+            <a:pPr algn="ctr"/>
+            <a:endParaRPr lang="en-SG" dirty="0">
+              <a:solidFill>
+                <a:schemeClr val="tx1"/>
+              </a:solidFill>
+            </a:endParaRPr>
+          </a:p>
         </p:txBody>
       </p:sp>
       <p:sp>
@@ -3488,7 +3950,7 @@
         </p:nvSpPr>
         <p:spPr>
           <a:xfrm>
-            <a:off x="3494842" y="3078332"/>
+            <a:off x="2904292" y="2887832"/>
             <a:ext cx="2059619" cy="701336"/>
           </a:xfrm>
           <a:prstGeom prst="rect">
@@ -3535,6 +3997,14 @@
               <a:t>API Gateway</a:t>
             </a:r>
           </a:p>
+          <a:p>
+            <a:pPr algn="ctr"/>
+            <a:endParaRPr lang="en-SG" dirty="0">
+              <a:solidFill>
+                <a:schemeClr val="tx1"/>
+              </a:solidFill>
+            </a:endParaRPr>
+          </a:p>
         </p:txBody>
       </p:sp>
       <p:sp>
@@ -3551,7 +4021,7 @@
         </p:nvSpPr>
         <p:spPr>
           <a:xfrm>
-            <a:off x="948431" y="3078332"/>
+            <a:off x="357881" y="2887832"/>
             <a:ext cx="2059619" cy="701336"/>
           </a:xfrm>
           <a:prstGeom prst="rect">
@@ -3595,7 +4065,7 @@
                   <a:schemeClr val="tx1"/>
                 </a:solidFill>
               </a:rPr>
-              <a:t>Client</a:t>
+              <a:t>Mobile App</a:t>
             </a:r>
           </a:p>
         </p:txBody>
@@ -3614,7 +4084,7 @@
         </p:nvSpPr>
         <p:spPr>
           <a:xfrm>
-            <a:off x="6189215" y="3078332"/>
+            <a:off x="5598665" y="2887832"/>
             <a:ext cx="2059619" cy="701336"/>
           </a:xfrm>
           <a:prstGeom prst="rect">
@@ -3661,6 +4131,14 @@
               <a:t>Order Service</a:t>
             </a:r>
           </a:p>
+          <a:p>
+            <a:pPr algn="ctr"/>
+            <a:endParaRPr lang="en-SG" dirty="0">
+              <a:solidFill>
+                <a:schemeClr val="tx1"/>
+              </a:solidFill>
+            </a:endParaRPr>
+          </a:p>
         </p:txBody>
       </p:sp>
       <p:sp>
@@ -3677,7 +4155,7 @@
         </p:nvSpPr>
         <p:spPr>
           <a:xfrm>
-            <a:off x="6189215" y="4191371"/>
+            <a:off x="5598665" y="4000871"/>
             <a:ext cx="2059619" cy="701336"/>
           </a:xfrm>
           <a:prstGeom prst="rect">
@@ -3732,6 +4210,14 @@
               <a:t> Service</a:t>
             </a:r>
           </a:p>
+          <a:p>
+            <a:pPr algn="ctr"/>
+            <a:endParaRPr lang="en-SG" dirty="0">
+              <a:solidFill>
+                <a:schemeClr val="tx1"/>
+              </a:solidFill>
+            </a:endParaRPr>
+          </a:p>
         </p:txBody>
       </p:sp>
       <p:sp>
@@ -3748,7 +4234,7 @@
         </p:nvSpPr>
         <p:spPr>
           <a:xfrm>
-            <a:off x="6189215" y="5304409"/>
+            <a:off x="5598665" y="5113909"/>
             <a:ext cx="2059619" cy="701336"/>
           </a:xfrm>
           <a:prstGeom prst="rect">
@@ -3792,8 +4278,16 @@
                   <a:schemeClr val="tx1"/>
                 </a:solidFill>
               </a:rPr>
-              <a:t>Review Service</a:t>
-            </a:r>
+              <a:t>Basket Service</a:t>
+            </a:r>
+          </a:p>
+          <a:p>
+            <a:pPr algn="ctr"/>
+            <a:endParaRPr lang="en-SG" dirty="0">
+              <a:solidFill>
+                <a:schemeClr val="tx1"/>
+              </a:solidFill>
+            </a:endParaRPr>
           </a:p>
         </p:txBody>
       </p:sp>
@@ -3814,12 +4308,17 @@
         </p:nvCxnSpPr>
         <p:spPr>
           <a:xfrm>
-            <a:off x="3008050" y="3429000"/>
+            <a:off x="2417500" y="3238500"/>
             <a:ext cx="486792" cy="0"/>
           </a:xfrm>
           <a:prstGeom prst="line">
             <a:avLst/>
           </a:prstGeom>
+          <a:ln>
+            <a:solidFill>
+              <a:schemeClr val="tx1"/>
+            </a:solidFill>
+          </a:ln>
         </p:spPr>
         <p:style>
           <a:lnRef idx="3">
@@ -3854,12 +4353,17 @@
         </p:nvCxnSpPr>
         <p:spPr>
           <a:xfrm flipV="1">
-            <a:off x="5554461" y="1202923"/>
+            <a:off x="4963911" y="1012423"/>
             <a:ext cx="611080" cy="2226077"/>
           </a:xfrm>
           <a:prstGeom prst="line">
             <a:avLst/>
           </a:prstGeom>
+          <a:ln>
+            <a:solidFill>
+              <a:schemeClr val="tx1"/>
+            </a:solidFill>
+          </a:ln>
         </p:spPr>
         <p:style>
           <a:lnRef idx="3">
@@ -3894,12 +4398,17 @@
         </p:nvCxnSpPr>
         <p:spPr>
           <a:xfrm flipV="1">
-            <a:off x="5554461" y="2315961"/>
+            <a:off x="4963911" y="2125461"/>
             <a:ext cx="634754" cy="1113039"/>
           </a:xfrm>
           <a:prstGeom prst="line">
             <a:avLst/>
           </a:prstGeom>
+          <a:ln>
+            <a:solidFill>
+              <a:schemeClr val="tx1"/>
+            </a:solidFill>
+          </a:ln>
         </p:spPr>
         <p:style>
           <a:lnRef idx="3">
@@ -3934,12 +4443,17 @@
         </p:nvCxnSpPr>
         <p:spPr>
           <a:xfrm>
-            <a:off x="5554461" y="3429000"/>
+            <a:off x="4963911" y="3238500"/>
             <a:ext cx="634754" cy="0"/>
           </a:xfrm>
           <a:prstGeom prst="line">
             <a:avLst/>
           </a:prstGeom>
+          <a:ln>
+            <a:solidFill>
+              <a:schemeClr val="tx1"/>
+            </a:solidFill>
+          </a:ln>
         </p:spPr>
         <p:style>
           <a:lnRef idx="3">
@@ -3974,12 +4488,17 @@
         </p:nvCxnSpPr>
         <p:spPr>
           <a:xfrm>
-            <a:off x="5554461" y="3429000"/>
+            <a:off x="4963911" y="3238500"/>
             <a:ext cx="634754" cy="1113039"/>
           </a:xfrm>
           <a:prstGeom prst="line">
             <a:avLst/>
           </a:prstGeom>
+          <a:ln>
+            <a:solidFill>
+              <a:schemeClr val="tx1"/>
+            </a:solidFill>
+          </a:ln>
         </p:spPr>
         <p:style>
           <a:lnRef idx="3">
@@ -4014,12 +4533,17 @@
         </p:nvCxnSpPr>
         <p:spPr>
           <a:xfrm>
-            <a:off x="5554461" y="3429000"/>
+            <a:off x="4963911" y="3238500"/>
             <a:ext cx="634754" cy="2226077"/>
           </a:xfrm>
           <a:prstGeom prst="line">
             <a:avLst/>
           </a:prstGeom>
+          <a:ln>
+            <a:solidFill>
+              <a:schemeClr val="tx1"/>
+            </a:solidFill>
+          </a:ln>
         </p:spPr>
         <p:style>
           <a:lnRef idx="3">
@@ -4050,8 +4574,8 @@
         </p:nvSpPr>
         <p:spPr>
           <a:xfrm>
-            <a:off x="10093911" y="730630"/>
-            <a:ext cx="710214" cy="944585"/>
+            <a:off x="8362365" y="464827"/>
+            <a:ext cx="527320" cy="701336"/>
           </a:xfrm>
           <a:prstGeom prst="can">
             <a:avLst/>
@@ -4088,16 +4612,63 @@
           <a:lstStyle/>
           <a:p>
             <a:pPr algn="ctr"/>
-            <a:endParaRPr lang="en-SG"/>
-          </a:p>
-        </p:txBody>
-      </p:sp>
-      <p:sp>
-        <p:nvSpPr>
-          <p:cNvPr id="33" name="Cylinder 32">
-            <a:extLst>
-              <a:ext uri="{FF2B5EF4-FFF2-40B4-BE49-F238E27FC236}">
-                <a16:creationId xmlns:a16="http://schemas.microsoft.com/office/drawing/2014/main" id="{22243969-1389-4FD2-9A3D-2D59B9B6B2FC}"/>
+            <a:endParaRPr lang="en-SG" sz="800" dirty="0">
+              <a:solidFill>
+                <a:schemeClr val="tx1"/>
+              </a:solidFill>
+            </a:endParaRPr>
+          </a:p>
+        </p:txBody>
+      </p:sp>
+      <p:cxnSp>
+        <p:nvCxnSpPr>
+          <p:cNvPr id="37" name="Straight Connector 36">
+            <a:extLst>
+              <a:ext uri="{FF2B5EF4-FFF2-40B4-BE49-F238E27FC236}">
+                <a16:creationId xmlns:a16="http://schemas.microsoft.com/office/drawing/2014/main" id="{0B8302C4-9E7A-45A5-9CF4-86C3AD2027A7}"/>
+              </a:ext>
+            </a:extLst>
+          </p:cNvPr>
+          <p:cNvCxnSpPr>
+            <a:cxnSpLocks/>
+          </p:cNvCxnSpPr>
+          <p:nvPr/>
+        </p:nvCxnSpPr>
+        <p:spPr>
+          <a:xfrm>
+            <a:off x="7624500" y="840973"/>
+            <a:ext cx="737865" cy="0"/>
+          </a:xfrm>
+          <a:prstGeom prst="line">
+            <a:avLst/>
+          </a:prstGeom>
+          <a:ln>
+            <a:solidFill>
+              <a:schemeClr val="tx1"/>
+            </a:solidFill>
+          </a:ln>
+        </p:spPr>
+        <p:style>
+          <a:lnRef idx="3">
+            <a:schemeClr val="accent2"/>
+          </a:lnRef>
+          <a:fillRef idx="0">
+            <a:schemeClr val="accent2"/>
+          </a:fillRef>
+          <a:effectRef idx="2">
+            <a:schemeClr val="accent2"/>
+          </a:effectRef>
+          <a:fontRef idx="minor">
+            <a:schemeClr val="tx1"/>
+          </a:fontRef>
+        </p:style>
+      </p:cxnSp>
+      <p:sp>
+        <p:nvSpPr>
+          <p:cNvPr id="45" name="Cylinder 44">
+            <a:extLst>
+              <a:ext uri="{FF2B5EF4-FFF2-40B4-BE49-F238E27FC236}">
+                <a16:creationId xmlns:a16="http://schemas.microsoft.com/office/drawing/2014/main" id="{9512F0E5-10E9-4B7E-8D1B-739DDC9D903F}"/>
               </a:ext>
             </a:extLst>
           </p:cNvPr>
@@ -4106,16 +4677,14 @@
         </p:nvSpPr>
         <p:spPr>
           <a:xfrm>
-            <a:off x="10093911" y="1843668"/>
-            <a:ext cx="710214" cy="944585"/>
+            <a:off x="10168433" y="636276"/>
+            <a:ext cx="727755" cy="5133333"/>
           </a:xfrm>
           <a:prstGeom prst="can">
             <a:avLst/>
           </a:prstGeom>
           <a:solidFill>
-            <a:schemeClr val="bg1">
-              <a:lumMod val="85000"/>
-            </a:schemeClr>
+            <a:schemeClr val="accent6"/>
           </a:solidFill>
           <a:ln>
             <a:solidFill>
@@ -4144,16 +4713,62 @@
           <a:lstStyle/>
           <a:p>
             <a:pPr algn="ctr"/>
-            <a:endParaRPr lang="en-SG"/>
-          </a:p>
-        </p:txBody>
-      </p:sp>
-      <p:sp>
-        <p:nvSpPr>
-          <p:cNvPr id="34" name="Cylinder 33">
-            <a:extLst>
-              <a:ext uri="{FF2B5EF4-FFF2-40B4-BE49-F238E27FC236}">
-                <a16:creationId xmlns:a16="http://schemas.microsoft.com/office/drawing/2014/main" id="{67F10565-B776-4DF3-AC8E-4B8B36E51343}"/>
+            <a:r>
+              <a:rPr lang="en-SG" dirty="0"/>
+              <a:t>Event Bus</a:t>
+            </a:r>
+          </a:p>
+        </p:txBody>
+      </p:sp>
+      <p:cxnSp>
+        <p:nvCxnSpPr>
+          <p:cNvPr id="14" name="Straight Arrow Connector 13">
+            <a:extLst>
+              <a:ext uri="{FF2B5EF4-FFF2-40B4-BE49-F238E27FC236}">
+                <a16:creationId xmlns:a16="http://schemas.microsoft.com/office/drawing/2014/main" id="{95843CDA-8D06-4F88-B7B0-2D4016CE3A93}"/>
+              </a:ext>
+            </a:extLst>
+          </p:cNvPr>
+          <p:cNvCxnSpPr/>
+          <p:nvPr/>
+        </p:nvCxnSpPr>
+        <p:spPr>
+          <a:xfrm>
+            <a:off x="7634610" y="1248791"/>
+            <a:ext cx="2533824" cy="0"/>
+          </a:xfrm>
+          <a:prstGeom prst="straightConnector1">
+            <a:avLst/>
+          </a:prstGeom>
+          <a:ln w="19050">
+            <a:solidFill>
+              <a:schemeClr val="tx1"/>
+            </a:solidFill>
+            <a:headEnd type="triangle"/>
+            <a:tailEnd type="triangle"/>
+          </a:ln>
+        </p:spPr>
+        <p:style>
+          <a:lnRef idx="1">
+            <a:schemeClr val="dk1"/>
+          </a:lnRef>
+          <a:fillRef idx="0">
+            <a:schemeClr val="dk1"/>
+          </a:fillRef>
+          <a:effectRef idx="0">
+            <a:schemeClr val="dk1"/>
+          </a:effectRef>
+          <a:fontRef idx="minor">
+            <a:schemeClr val="tx1"/>
+          </a:fontRef>
+        </p:style>
+      </p:cxnSp>
+      <p:sp>
+        <p:nvSpPr>
+          <p:cNvPr id="48" name="Cylinder 47">
+            <a:extLst>
+              <a:ext uri="{FF2B5EF4-FFF2-40B4-BE49-F238E27FC236}">
+                <a16:creationId xmlns:a16="http://schemas.microsoft.com/office/drawing/2014/main" id="{975B8C93-D24D-4F21-A304-1B07B4FA9D75}"/>
               </a:ext>
             </a:extLst>
           </p:cNvPr>
@@ -4162,8 +4777,8 @@
         </p:nvSpPr>
         <p:spPr>
           <a:xfrm>
-            <a:off x="10093911" y="2956706"/>
-            <a:ext cx="710214" cy="944585"/>
+            <a:off x="8386039" y="1562374"/>
+            <a:ext cx="527320" cy="701336"/>
           </a:xfrm>
           <a:prstGeom prst="can">
             <a:avLst/>
@@ -4204,142 +4819,33 @@
           </a:p>
         </p:txBody>
       </p:sp>
-      <p:sp>
-        <p:nvSpPr>
-          <p:cNvPr id="35" name="Cylinder 34">
-            <a:extLst>
-              <a:ext uri="{FF2B5EF4-FFF2-40B4-BE49-F238E27FC236}">
-                <a16:creationId xmlns:a16="http://schemas.microsoft.com/office/drawing/2014/main" id="{B34F5759-4669-4F36-8564-DD760160AD2E}"/>
-              </a:ext>
-            </a:extLst>
-          </p:cNvPr>
-          <p:cNvSpPr/>
+      <p:cxnSp>
+        <p:nvCxnSpPr>
+          <p:cNvPr id="49" name="Straight Connector 48">
+            <a:extLst>
+              <a:ext uri="{FF2B5EF4-FFF2-40B4-BE49-F238E27FC236}">
+                <a16:creationId xmlns:a16="http://schemas.microsoft.com/office/drawing/2014/main" id="{76E50683-D755-4AF5-9E1D-AAC4E67474E9}"/>
+              </a:ext>
+            </a:extLst>
+          </p:cNvPr>
+          <p:cNvCxnSpPr>
+            <a:cxnSpLocks/>
+          </p:cNvCxnSpPr>
           <p:nvPr/>
-        </p:nvSpPr>
+        </p:nvCxnSpPr>
         <p:spPr>
           <a:xfrm>
-            <a:off x="10093911" y="4069744"/>
-            <a:ext cx="710214" cy="944585"/>
-          </a:xfrm>
-          <a:prstGeom prst="can">
+            <a:off x="7648174" y="1938520"/>
+            <a:ext cx="737865" cy="0"/>
+          </a:xfrm>
+          <a:prstGeom prst="line">
             <a:avLst/>
           </a:prstGeom>
-          <a:solidFill>
-            <a:schemeClr val="bg1">
-              <a:lumMod val="85000"/>
-            </a:schemeClr>
-          </a:solidFill>
           <a:ln>
             <a:solidFill>
               <a:schemeClr val="tx1"/>
             </a:solidFill>
           </a:ln>
-        </p:spPr>
-        <p:style>
-          <a:lnRef idx="2">
-            <a:schemeClr val="accent1">
-              <a:shade val="50000"/>
-            </a:schemeClr>
-          </a:lnRef>
-          <a:fillRef idx="1">
-            <a:schemeClr val="accent1"/>
-          </a:fillRef>
-          <a:effectRef idx="0">
-            <a:schemeClr val="accent1"/>
-          </a:effectRef>
-          <a:fontRef idx="minor">
-            <a:schemeClr val="lt1"/>
-          </a:fontRef>
-        </p:style>
-        <p:txBody>
-          <a:bodyPr rtlCol="0" anchor="ctr"/>
-          <a:lstStyle/>
-          <a:p>
-            <a:pPr algn="ctr"/>
-            <a:endParaRPr lang="en-SG"/>
-          </a:p>
-        </p:txBody>
-      </p:sp>
-      <p:sp>
-        <p:nvSpPr>
-          <p:cNvPr id="36" name="Cylinder 35">
-            <a:extLst>
-              <a:ext uri="{FF2B5EF4-FFF2-40B4-BE49-F238E27FC236}">
-                <a16:creationId xmlns:a16="http://schemas.microsoft.com/office/drawing/2014/main" id="{A51C8193-33CA-476D-98BA-1C24AD7562E9}"/>
-              </a:ext>
-            </a:extLst>
-          </p:cNvPr>
-          <p:cNvSpPr/>
-          <p:nvPr/>
-        </p:nvSpPr>
-        <p:spPr>
-          <a:xfrm>
-            <a:off x="10120545" y="5182785"/>
-            <a:ext cx="710214" cy="944585"/>
-          </a:xfrm>
-          <a:prstGeom prst="can">
-            <a:avLst/>
-          </a:prstGeom>
-          <a:solidFill>
-            <a:schemeClr val="bg1">
-              <a:lumMod val="85000"/>
-            </a:schemeClr>
-          </a:solidFill>
-          <a:ln>
-            <a:solidFill>
-              <a:schemeClr val="tx1"/>
-            </a:solidFill>
-          </a:ln>
-        </p:spPr>
-        <p:style>
-          <a:lnRef idx="2">
-            <a:schemeClr val="accent1">
-              <a:shade val="50000"/>
-            </a:schemeClr>
-          </a:lnRef>
-          <a:fillRef idx="1">
-            <a:schemeClr val="accent1"/>
-          </a:fillRef>
-          <a:effectRef idx="0">
-            <a:schemeClr val="accent1"/>
-          </a:effectRef>
-          <a:fontRef idx="minor">
-            <a:schemeClr val="lt1"/>
-          </a:fontRef>
-        </p:style>
-        <p:txBody>
-          <a:bodyPr rtlCol="0" anchor="ctr"/>
-          <a:lstStyle/>
-          <a:p>
-            <a:pPr algn="ctr"/>
-            <a:endParaRPr lang="en-SG"/>
-          </a:p>
-        </p:txBody>
-      </p:sp>
-      <p:cxnSp>
-        <p:nvCxnSpPr>
-          <p:cNvPr id="37" name="Straight Connector 36">
-            <a:extLst>
-              <a:ext uri="{FF2B5EF4-FFF2-40B4-BE49-F238E27FC236}">
-                <a16:creationId xmlns:a16="http://schemas.microsoft.com/office/drawing/2014/main" id="{0B8302C4-9E7A-45A5-9CF4-86C3AD2027A7}"/>
-              </a:ext>
-            </a:extLst>
-          </p:cNvPr>
-          <p:cNvCxnSpPr>
-            <a:cxnSpLocks/>
-            <a:stCxn id="4" idx="3"/>
-            <a:endCxn id="32" idx="2"/>
-          </p:cNvCxnSpPr>
-          <p:nvPr/>
-        </p:nvCxnSpPr>
-        <p:spPr>
-          <a:xfrm>
-            <a:off x="8225160" y="1202923"/>
-            <a:ext cx="1868751" cy="0"/>
-          </a:xfrm>
-          <a:prstGeom prst="line">
-            <a:avLst/>
-          </a:prstGeom>
         </p:spPr>
         <p:style>
           <a:lnRef idx="3">
@@ -4358,10 +4864,109 @@
       </p:cxnSp>
       <p:cxnSp>
         <p:nvCxnSpPr>
-          <p:cNvPr id="40" name="Straight Connector 39">
-            <a:extLst>
-              <a:ext uri="{FF2B5EF4-FFF2-40B4-BE49-F238E27FC236}">
-                <a16:creationId xmlns:a16="http://schemas.microsoft.com/office/drawing/2014/main" id="{84BCFD5F-86F4-4C80-9B83-3353F0FC99EA}"/>
+          <p:cNvPr id="50" name="Straight Arrow Connector 49">
+            <a:extLst>
+              <a:ext uri="{FF2B5EF4-FFF2-40B4-BE49-F238E27FC236}">
+                <a16:creationId xmlns:a16="http://schemas.microsoft.com/office/drawing/2014/main" id="{F377ED02-5D72-477B-966D-2C9273F6F816}"/>
+              </a:ext>
+            </a:extLst>
+          </p:cNvPr>
+          <p:cNvCxnSpPr/>
+          <p:nvPr/>
+        </p:nvCxnSpPr>
+        <p:spPr>
+          <a:xfrm>
+            <a:off x="7658284" y="2346338"/>
+            <a:ext cx="2533824" cy="0"/>
+          </a:xfrm>
+          <a:prstGeom prst="straightConnector1">
+            <a:avLst/>
+          </a:prstGeom>
+          <a:ln w="19050">
+            <a:solidFill>
+              <a:schemeClr val="tx1"/>
+            </a:solidFill>
+            <a:headEnd type="triangle"/>
+            <a:tailEnd type="triangle"/>
+          </a:ln>
+        </p:spPr>
+        <p:style>
+          <a:lnRef idx="1">
+            <a:schemeClr val="dk1"/>
+          </a:lnRef>
+          <a:fillRef idx="0">
+            <a:schemeClr val="dk1"/>
+          </a:fillRef>
+          <a:effectRef idx="0">
+            <a:schemeClr val="dk1"/>
+          </a:effectRef>
+          <a:fontRef idx="minor">
+            <a:schemeClr val="tx1"/>
+          </a:fontRef>
+        </p:style>
+      </p:cxnSp>
+      <p:sp>
+        <p:nvSpPr>
+          <p:cNvPr id="51" name="Cylinder 50">
+            <a:extLst>
+              <a:ext uri="{FF2B5EF4-FFF2-40B4-BE49-F238E27FC236}">
+                <a16:creationId xmlns:a16="http://schemas.microsoft.com/office/drawing/2014/main" id="{7997A340-679D-417D-802C-A98A804C0AF0}"/>
+              </a:ext>
+            </a:extLst>
+          </p:cNvPr>
+          <p:cNvSpPr/>
+          <p:nvPr/>
+        </p:nvSpPr>
+        <p:spPr>
+          <a:xfrm>
+            <a:off x="8386039" y="2659922"/>
+            <a:ext cx="527320" cy="701336"/>
+          </a:xfrm>
+          <a:prstGeom prst="can">
+            <a:avLst/>
+          </a:prstGeom>
+          <a:solidFill>
+            <a:schemeClr val="bg1">
+              <a:lumMod val="85000"/>
+            </a:schemeClr>
+          </a:solidFill>
+          <a:ln>
+            <a:solidFill>
+              <a:schemeClr val="tx1"/>
+            </a:solidFill>
+          </a:ln>
+        </p:spPr>
+        <p:style>
+          <a:lnRef idx="2">
+            <a:schemeClr val="accent1">
+              <a:shade val="50000"/>
+            </a:schemeClr>
+          </a:lnRef>
+          <a:fillRef idx="1">
+            <a:schemeClr val="accent1"/>
+          </a:fillRef>
+          <a:effectRef idx="0">
+            <a:schemeClr val="accent1"/>
+          </a:effectRef>
+          <a:fontRef idx="minor">
+            <a:schemeClr val="lt1"/>
+          </a:fontRef>
+        </p:style>
+        <p:txBody>
+          <a:bodyPr rtlCol="0" anchor="ctr"/>
+          <a:lstStyle/>
+          <a:p>
+            <a:pPr algn="ctr"/>
+            <a:endParaRPr lang="en-SG"/>
+          </a:p>
+        </p:txBody>
+      </p:sp>
+      <p:cxnSp>
+        <p:nvCxnSpPr>
+          <p:cNvPr id="52" name="Straight Connector 51">
+            <a:extLst>
+              <a:ext uri="{FF2B5EF4-FFF2-40B4-BE49-F238E27FC236}">
+                <a16:creationId xmlns:a16="http://schemas.microsoft.com/office/drawing/2014/main" id="{31FC1903-88D4-409A-9943-19690B2B3E6C}"/>
               </a:ext>
             </a:extLst>
           </p:cNvPr>
@@ -4372,12 +4977,17 @@
         </p:nvCxnSpPr>
         <p:spPr>
           <a:xfrm>
-            <a:off x="8225159" y="2315960"/>
-            <a:ext cx="1868751" cy="0"/>
+            <a:off x="7648174" y="3036068"/>
+            <a:ext cx="737865" cy="0"/>
           </a:xfrm>
           <a:prstGeom prst="line">
             <a:avLst/>
           </a:prstGeom>
+          <a:ln>
+            <a:solidFill>
+              <a:schemeClr val="tx1"/>
+            </a:solidFill>
+          </a:ln>
         </p:spPr>
         <p:style>
           <a:lnRef idx="3">
@@ -4396,10 +5006,53 @@
       </p:cxnSp>
       <p:cxnSp>
         <p:nvCxnSpPr>
-          <p:cNvPr id="41" name="Straight Connector 40">
-            <a:extLst>
-              <a:ext uri="{FF2B5EF4-FFF2-40B4-BE49-F238E27FC236}">
-                <a16:creationId xmlns:a16="http://schemas.microsoft.com/office/drawing/2014/main" id="{AE797C5C-12D4-4F19-8813-1789F2273D75}"/>
+          <p:cNvPr id="53" name="Straight Arrow Connector 52">
+            <a:extLst>
+              <a:ext uri="{FF2B5EF4-FFF2-40B4-BE49-F238E27FC236}">
+                <a16:creationId xmlns:a16="http://schemas.microsoft.com/office/drawing/2014/main" id="{1B9DB09E-7993-4766-9B48-77BC9B5B8CAC}"/>
+              </a:ext>
+            </a:extLst>
+          </p:cNvPr>
+          <p:cNvCxnSpPr/>
+          <p:nvPr/>
+        </p:nvCxnSpPr>
+        <p:spPr>
+          <a:xfrm>
+            <a:off x="7658284" y="3443886"/>
+            <a:ext cx="2533824" cy="0"/>
+          </a:xfrm>
+          <a:prstGeom prst="straightConnector1">
+            <a:avLst/>
+          </a:prstGeom>
+          <a:ln w="19050">
+            <a:solidFill>
+              <a:schemeClr val="tx1"/>
+            </a:solidFill>
+            <a:headEnd type="triangle"/>
+            <a:tailEnd type="triangle"/>
+          </a:ln>
+        </p:spPr>
+        <p:style>
+          <a:lnRef idx="1">
+            <a:schemeClr val="dk1"/>
+          </a:lnRef>
+          <a:fillRef idx="0">
+            <a:schemeClr val="dk1"/>
+          </a:fillRef>
+          <a:effectRef idx="0">
+            <a:schemeClr val="dk1"/>
+          </a:effectRef>
+          <a:fontRef idx="minor">
+            <a:schemeClr val="tx1"/>
+          </a:fontRef>
+        </p:style>
+      </p:cxnSp>
+      <p:cxnSp>
+        <p:nvCxnSpPr>
+          <p:cNvPr id="55" name="Straight Connector 54">
+            <a:extLst>
+              <a:ext uri="{FF2B5EF4-FFF2-40B4-BE49-F238E27FC236}">
+                <a16:creationId xmlns:a16="http://schemas.microsoft.com/office/drawing/2014/main" id="{DAF9E884-FF43-444C-B615-0F4452225E84}"/>
               </a:ext>
             </a:extLst>
           </p:cNvPr>
@@ -4410,12 +5063,17 @@
         </p:nvCxnSpPr>
         <p:spPr>
           <a:xfrm>
-            <a:off x="8225159" y="3411610"/>
-            <a:ext cx="1868751" cy="0"/>
+            <a:off x="7648174" y="4178026"/>
+            <a:ext cx="737865" cy="0"/>
           </a:xfrm>
           <a:prstGeom prst="line">
             <a:avLst/>
           </a:prstGeom>
+          <a:ln>
+            <a:solidFill>
+              <a:schemeClr val="tx1"/>
+            </a:solidFill>
+          </a:ln>
         </p:spPr>
         <p:style>
           <a:lnRef idx="3">
@@ -4434,10 +5092,109 @@
       </p:cxnSp>
       <p:cxnSp>
         <p:nvCxnSpPr>
-          <p:cNvPr id="42" name="Straight Connector 41">
-            <a:extLst>
-              <a:ext uri="{FF2B5EF4-FFF2-40B4-BE49-F238E27FC236}">
-                <a16:creationId xmlns:a16="http://schemas.microsoft.com/office/drawing/2014/main" id="{F5075AFE-0F7A-40B1-B35F-BB644FAFE92F}"/>
+          <p:cNvPr id="56" name="Straight Arrow Connector 55">
+            <a:extLst>
+              <a:ext uri="{FF2B5EF4-FFF2-40B4-BE49-F238E27FC236}">
+                <a16:creationId xmlns:a16="http://schemas.microsoft.com/office/drawing/2014/main" id="{15A92439-C509-4B37-B938-5F51216021AD}"/>
+              </a:ext>
+            </a:extLst>
+          </p:cNvPr>
+          <p:cNvCxnSpPr/>
+          <p:nvPr/>
+        </p:nvCxnSpPr>
+        <p:spPr>
+          <a:xfrm>
+            <a:off x="7658284" y="4585844"/>
+            <a:ext cx="2533824" cy="0"/>
+          </a:xfrm>
+          <a:prstGeom prst="straightConnector1">
+            <a:avLst/>
+          </a:prstGeom>
+          <a:ln w="19050">
+            <a:solidFill>
+              <a:schemeClr val="tx1"/>
+            </a:solidFill>
+            <a:headEnd type="triangle"/>
+            <a:tailEnd type="triangle"/>
+          </a:ln>
+        </p:spPr>
+        <p:style>
+          <a:lnRef idx="1">
+            <a:schemeClr val="dk1"/>
+          </a:lnRef>
+          <a:fillRef idx="0">
+            <a:schemeClr val="dk1"/>
+          </a:fillRef>
+          <a:effectRef idx="0">
+            <a:schemeClr val="dk1"/>
+          </a:effectRef>
+          <a:fontRef idx="minor">
+            <a:schemeClr val="tx1"/>
+          </a:fontRef>
+        </p:style>
+      </p:cxnSp>
+      <p:sp>
+        <p:nvSpPr>
+          <p:cNvPr id="57" name="Cylinder 56">
+            <a:extLst>
+              <a:ext uri="{FF2B5EF4-FFF2-40B4-BE49-F238E27FC236}">
+                <a16:creationId xmlns:a16="http://schemas.microsoft.com/office/drawing/2014/main" id="{EA12F07A-4A99-44C3-A5C5-33F8AE5BDCF5}"/>
+              </a:ext>
+            </a:extLst>
+          </p:cNvPr>
+          <p:cNvSpPr/>
+          <p:nvPr/>
+        </p:nvSpPr>
+        <p:spPr>
+          <a:xfrm>
+            <a:off x="8386039" y="4898062"/>
+            <a:ext cx="527320" cy="701336"/>
+          </a:xfrm>
+          <a:prstGeom prst="can">
+            <a:avLst/>
+          </a:prstGeom>
+          <a:solidFill>
+            <a:schemeClr val="bg1">
+              <a:lumMod val="85000"/>
+            </a:schemeClr>
+          </a:solidFill>
+          <a:ln>
+            <a:solidFill>
+              <a:schemeClr val="tx1"/>
+            </a:solidFill>
+          </a:ln>
+        </p:spPr>
+        <p:style>
+          <a:lnRef idx="2">
+            <a:schemeClr val="accent1">
+              <a:shade val="50000"/>
+            </a:schemeClr>
+          </a:lnRef>
+          <a:fillRef idx="1">
+            <a:schemeClr val="accent1"/>
+          </a:fillRef>
+          <a:effectRef idx="0">
+            <a:schemeClr val="accent1"/>
+          </a:effectRef>
+          <a:fontRef idx="minor">
+            <a:schemeClr val="lt1"/>
+          </a:fontRef>
+        </p:style>
+        <p:txBody>
+          <a:bodyPr rtlCol="0" anchor="ctr"/>
+          <a:lstStyle/>
+          <a:p>
+            <a:pPr algn="ctr"/>
+            <a:endParaRPr lang="en-SG"/>
+          </a:p>
+        </p:txBody>
+      </p:sp>
+      <p:cxnSp>
+        <p:nvCxnSpPr>
+          <p:cNvPr id="58" name="Straight Connector 57">
+            <a:extLst>
+              <a:ext uri="{FF2B5EF4-FFF2-40B4-BE49-F238E27FC236}">
+                <a16:creationId xmlns:a16="http://schemas.microsoft.com/office/drawing/2014/main" id="{8758C2BE-74A0-451E-8886-CFB5261D0507}"/>
               </a:ext>
             </a:extLst>
           </p:cNvPr>
@@ -4448,12 +5205,17 @@
         </p:nvCxnSpPr>
         <p:spPr>
           <a:xfrm>
-            <a:off x="8248834" y="4542036"/>
-            <a:ext cx="1868751" cy="0"/>
+            <a:off x="7648174" y="5274208"/>
+            <a:ext cx="737865" cy="0"/>
           </a:xfrm>
           <a:prstGeom prst="line">
             <a:avLst/>
           </a:prstGeom>
+          <a:ln>
+            <a:solidFill>
+              <a:schemeClr val="tx1"/>
+            </a:solidFill>
+          </a:ln>
         </p:spPr>
         <p:style>
           <a:lnRef idx="3">
@@ -4472,42 +5234,609 @@
       </p:cxnSp>
       <p:cxnSp>
         <p:nvCxnSpPr>
-          <p:cNvPr id="43" name="Straight Connector 42">
-            <a:extLst>
-              <a:ext uri="{FF2B5EF4-FFF2-40B4-BE49-F238E27FC236}">
-                <a16:creationId xmlns:a16="http://schemas.microsoft.com/office/drawing/2014/main" id="{BF4712DA-392E-444A-ADA2-32F24A6A83A5}"/>
-              </a:ext>
-            </a:extLst>
-          </p:cNvPr>
-          <p:cNvCxnSpPr>
-            <a:cxnSpLocks/>
-          </p:cNvCxnSpPr>
+          <p:cNvPr id="59" name="Straight Arrow Connector 58">
+            <a:extLst>
+              <a:ext uri="{FF2B5EF4-FFF2-40B4-BE49-F238E27FC236}">
+                <a16:creationId xmlns:a16="http://schemas.microsoft.com/office/drawing/2014/main" id="{EAA184CD-BDFF-4407-BBE0-E09DF4F5A4ED}"/>
+              </a:ext>
+            </a:extLst>
+          </p:cNvPr>
+          <p:cNvCxnSpPr/>
           <p:nvPr/>
         </p:nvCxnSpPr>
         <p:spPr>
           <a:xfrm>
-            <a:off x="8248834" y="5655077"/>
-            <a:ext cx="1868751" cy="0"/>
-          </a:xfrm>
-          <a:prstGeom prst="line">
+            <a:off x="7658284" y="5682026"/>
+            <a:ext cx="2533824" cy="0"/>
+          </a:xfrm>
+          <a:prstGeom prst="straightConnector1">
             <a:avLst/>
           </a:prstGeom>
+          <a:ln w="19050">
+            <a:solidFill>
+              <a:schemeClr val="tx1"/>
+            </a:solidFill>
+            <a:headEnd type="triangle"/>
+            <a:tailEnd type="triangle"/>
+          </a:ln>
         </p:spPr>
         <p:style>
-          <a:lnRef idx="3">
-            <a:schemeClr val="accent2"/>
+          <a:lnRef idx="1">
+            <a:schemeClr val="dk1"/>
           </a:lnRef>
           <a:fillRef idx="0">
-            <a:schemeClr val="accent2"/>
+            <a:schemeClr val="dk1"/>
           </a:fillRef>
-          <a:effectRef idx="2">
-            <a:schemeClr val="accent2"/>
+          <a:effectRef idx="0">
+            <a:schemeClr val="dk1"/>
           </a:effectRef>
           <a:fontRef idx="minor">
             <a:schemeClr val="tx1"/>
           </a:fontRef>
         </p:style>
       </p:cxnSp>
+      <p:pic>
+        <p:nvPicPr>
+          <p:cNvPr id="1026" name="Picture 2" descr="Database Week: Microsoft OEMs Redis Enterprise for Azure | ZDNet">
+            <a:extLst>
+              <a:ext uri="{FF2B5EF4-FFF2-40B4-BE49-F238E27FC236}">
+                <a16:creationId xmlns:a16="http://schemas.microsoft.com/office/drawing/2014/main" id="{A2E29F72-B8CD-4D4E-9CD7-A735DF816556}"/>
+              </a:ext>
+            </a:extLst>
+          </p:cNvPr>
+          <p:cNvPicPr>
+            <a:picLocks noChangeAspect="1" noChangeArrowheads="1"/>
+          </p:cNvPicPr>
+          <p:nvPr/>
+        </p:nvPicPr>
+        <p:blipFill rotWithShape="1">
+          <a:blip r:embed="rId3">
+            <a:extLst>
+              <a:ext uri="{28A0092B-C50C-407E-A947-70E740481C1C}">
+                <a14:useLocalDpi xmlns:a14="http://schemas.microsoft.com/office/drawing/2010/main" val="0"/>
+              </a:ext>
+            </a:extLst>
+          </a:blip>
+          <a:srcRect l="21398" t="25598" r="19620" b="21564"/>
+          <a:stretch/>
+        </p:blipFill>
+        <p:spPr bwMode="auto">
+          <a:xfrm>
+            <a:off x="8415608" y="3851704"/>
+            <a:ext cx="777499" cy="696515"/>
+          </a:xfrm>
+          <a:prstGeom prst="rect">
+            <a:avLst/>
+          </a:prstGeom>
+          <a:noFill/>
+          <a:extLst>
+            <a:ext uri="{909E8E84-426E-40DD-AFC4-6F175D3DCCD1}">
+              <a14:hiddenFill xmlns:a14="http://schemas.microsoft.com/office/drawing/2010/main">
+                <a:solidFill>
+                  <a:srgbClr val="FFFFFF"/>
+                </a:solidFill>
+              </a14:hiddenFill>
+            </a:ext>
+          </a:extLst>
+        </p:spPr>
+      </p:pic>
+      <p:pic>
+        <p:nvPicPr>
+          <p:cNvPr id="1030" name="Picture 6">
+            <a:extLst>
+              <a:ext uri="{FF2B5EF4-FFF2-40B4-BE49-F238E27FC236}">
+                <a16:creationId xmlns:a16="http://schemas.microsoft.com/office/drawing/2014/main" id="{B8C6B852-6ADC-48B5-9824-7EC31E8AEA9A}"/>
+              </a:ext>
+            </a:extLst>
+          </p:cNvPr>
+          <p:cNvPicPr>
+            <a:picLocks noChangeAspect="1" noChangeArrowheads="1"/>
+          </p:cNvPicPr>
+          <p:nvPr/>
+        </p:nvPicPr>
+        <p:blipFill>
+          <a:blip r:embed="rId4">
+            <a:extLst>
+              <a:ext uri="{28A0092B-C50C-407E-A947-70E740481C1C}">
+                <a14:useLocalDpi xmlns:a14="http://schemas.microsoft.com/office/drawing/2010/main" val="0"/>
+              </a:ext>
+            </a:extLst>
+          </a:blip>
+          <a:srcRect/>
+          <a:stretch>
+            <a:fillRect/>
+          </a:stretch>
+        </p:blipFill>
+        <p:spPr bwMode="auto">
+          <a:xfrm>
+            <a:off x="10356176" y="3611568"/>
+            <a:ext cx="347334" cy="366902"/>
+          </a:xfrm>
+          <a:prstGeom prst="rect">
+            <a:avLst/>
+          </a:prstGeom>
+          <a:noFill/>
+          <a:extLst>
+            <a:ext uri="{909E8E84-426E-40DD-AFC4-6F175D3DCCD1}">
+              <a14:hiddenFill xmlns:a14="http://schemas.microsoft.com/office/drawing/2010/main">
+                <a:solidFill>
+                  <a:srgbClr val="FFFFFF"/>
+                </a:solidFill>
+              </a14:hiddenFill>
+            </a:ext>
+          </a:extLst>
+        </p:spPr>
+      </p:pic>
+      <p:pic>
+        <p:nvPicPr>
+          <p:cNvPr id="1032" name="Picture 8" descr="MySQL logo and symbol, meaning, history, PNG">
+            <a:extLst>
+              <a:ext uri="{FF2B5EF4-FFF2-40B4-BE49-F238E27FC236}">
+                <a16:creationId xmlns:a16="http://schemas.microsoft.com/office/drawing/2014/main" id="{3D88867C-4DCA-4185-9DEF-EA99BBC55F90}"/>
+              </a:ext>
+            </a:extLst>
+          </p:cNvPr>
+          <p:cNvPicPr>
+            <a:picLocks noChangeAspect="1" noChangeArrowheads="1"/>
+          </p:cNvPicPr>
+          <p:nvPr/>
+        </p:nvPicPr>
+        <p:blipFill>
+          <a:blip r:embed="rId5">
+            <a:extLst>
+              <a:ext uri="{28A0092B-C50C-407E-A947-70E740481C1C}">
+                <a14:useLocalDpi xmlns:a14="http://schemas.microsoft.com/office/drawing/2010/main" val="0"/>
+              </a:ext>
+            </a:extLst>
+          </a:blip>
+          <a:srcRect/>
+          <a:stretch>
+            <a:fillRect/>
+          </a:stretch>
+        </p:blipFill>
+        <p:spPr bwMode="auto">
+          <a:xfrm>
+            <a:off x="8381595" y="706797"/>
+            <a:ext cx="488860" cy="305626"/>
+          </a:xfrm>
+          <a:prstGeom prst="rect">
+            <a:avLst/>
+          </a:prstGeom>
+          <a:noFill/>
+          <a:extLst>
+            <a:ext uri="{909E8E84-426E-40DD-AFC4-6F175D3DCCD1}">
+              <a14:hiddenFill xmlns:a14="http://schemas.microsoft.com/office/drawing/2010/main">
+                <a:solidFill>
+                  <a:srgbClr val="FFFFFF"/>
+                </a:solidFill>
+              </a14:hiddenFill>
+            </a:ext>
+          </a:extLst>
+        </p:spPr>
+      </p:pic>
+      <p:pic>
+        <p:nvPicPr>
+          <p:cNvPr id="63" name="Picture 8" descr="MySQL logo and symbol, meaning, history, PNG">
+            <a:extLst>
+              <a:ext uri="{FF2B5EF4-FFF2-40B4-BE49-F238E27FC236}">
+                <a16:creationId xmlns:a16="http://schemas.microsoft.com/office/drawing/2014/main" id="{62053CED-507D-491A-BDC4-06D89CFEF3B3}"/>
+              </a:ext>
+            </a:extLst>
+          </p:cNvPr>
+          <p:cNvPicPr>
+            <a:picLocks noChangeAspect="1" noChangeArrowheads="1"/>
+          </p:cNvPicPr>
+          <p:nvPr/>
+        </p:nvPicPr>
+        <p:blipFill>
+          <a:blip r:embed="rId5">
+            <a:extLst>
+              <a:ext uri="{28A0092B-C50C-407E-A947-70E740481C1C}">
+                <a14:useLocalDpi xmlns:a14="http://schemas.microsoft.com/office/drawing/2010/main" val="0"/>
+              </a:ext>
+            </a:extLst>
+          </a:blip>
+          <a:srcRect/>
+          <a:stretch>
+            <a:fillRect/>
+          </a:stretch>
+        </p:blipFill>
+        <p:spPr bwMode="auto">
+          <a:xfrm>
+            <a:off x="8400825" y="1792817"/>
+            <a:ext cx="488860" cy="305626"/>
+          </a:xfrm>
+          <a:prstGeom prst="rect">
+            <a:avLst/>
+          </a:prstGeom>
+          <a:noFill/>
+          <a:extLst>
+            <a:ext uri="{909E8E84-426E-40DD-AFC4-6F175D3DCCD1}">
+              <a14:hiddenFill xmlns:a14="http://schemas.microsoft.com/office/drawing/2010/main">
+                <a:solidFill>
+                  <a:srgbClr val="FFFFFF"/>
+                </a:solidFill>
+              </a14:hiddenFill>
+            </a:ext>
+          </a:extLst>
+        </p:spPr>
+      </p:pic>
+      <p:pic>
+        <p:nvPicPr>
+          <p:cNvPr id="64" name="Picture 8" descr="MySQL logo and symbol, meaning, history, PNG">
+            <a:extLst>
+              <a:ext uri="{FF2B5EF4-FFF2-40B4-BE49-F238E27FC236}">
+                <a16:creationId xmlns:a16="http://schemas.microsoft.com/office/drawing/2014/main" id="{11874ED3-71C0-443A-B34A-D7F83646EEEB}"/>
+              </a:ext>
+            </a:extLst>
+          </p:cNvPr>
+          <p:cNvPicPr>
+            <a:picLocks noChangeAspect="1" noChangeArrowheads="1"/>
+          </p:cNvPicPr>
+          <p:nvPr/>
+        </p:nvPicPr>
+        <p:blipFill>
+          <a:blip r:embed="rId5">
+            <a:extLst>
+              <a:ext uri="{28A0092B-C50C-407E-A947-70E740481C1C}">
+                <a14:useLocalDpi xmlns:a14="http://schemas.microsoft.com/office/drawing/2010/main" val="0"/>
+              </a:ext>
+            </a:extLst>
+          </a:blip>
+          <a:srcRect/>
+          <a:stretch>
+            <a:fillRect/>
+          </a:stretch>
+        </p:blipFill>
+        <p:spPr bwMode="auto">
+          <a:xfrm>
+            <a:off x="8411018" y="2860658"/>
+            <a:ext cx="488860" cy="305626"/>
+          </a:xfrm>
+          <a:prstGeom prst="rect">
+            <a:avLst/>
+          </a:prstGeom>
+          <a:noFill/>
+          <a:extLst>
+            <a:ext uri="{909E8E84-426E-40DD-AFC4-6F175D3DCCD1}">
+              <a14:hiddenFill xmlns:a14="http://schemas.microsoft.com/office/drawing/2010/main">
+                <a:solidFill>
+                  <a:srgbClr val="FFFFFF"/>
+                </a:solidFill>
+              </a14:hiddenFill>
+            </a:ext>
+          </a:extLst>
+        </p:spPr>
+      </p:pic>
+      <p:pic>
+        <p:nvPicPr>
+          <p:cNvPr id="65" name="Picture 8" descr="MySQL logo and symbol, meaning, history, PNG">
+            <a:extLst>
+              <a:ext uri="{FF2B5EF4-FFF2-40B4-BE49-F238E27FC236}">
+                <a16:creationId xmlns:a16="http://schemas.microsoft.com/office/drawing/2014/main" id="{4515B9C4-FB65-45A2-8194-8BAAF4178F2C}"/>
+              </a:ext>
+            </a:extLst>
+          </p:cNvPr>
+          <p:cNvPicPr>
+            <a:picLocks noChangeAspect="1" noChangeArrowheads="1"/>
+          </p:cNvPicPr>
+          <p:nvPr/>
+        </p:nvPicPr>
+        <p:blipFill>
+          <a:blip r:embed="rId5">
+            <a:extLst>
+              <a:ext uri="{28A0092B-C50C-407E-A947-70E740481C1C}">
+                <a14:useLocalDpi xmlns:a14="http://schemas.microsoft.com/office/drawing/2010/main" val="0"/>
+              </a:ext>
+            </a:extLst>
+          </a:blip>
+          <a:srcRect/>
+          <a:stretch>
+            <a:fillRect/>
+          </a:stretch>
+        </p:blipFill>
+        <p:spPr bwMode="auto">
+          <a:xfrm>
+            <a:off x="8439196" y="5095917"/>
+            <a:ext cx="488860" cy="305626"/>
+          </a:xfrm>
+          <a:prstGeom prst="rect">
+            <a:avLst/>
+          </a:prstGeom>
+          <a:noFill/>
+          <a:extLst>
+            <a:ext uri="{909E8E84-426E-40DD-AFC4-6F175D3DCCD1}">
+              <a14:hiddenFill xmlns:a14="http://schemas.microsoft.com/office/drawing/2010/main">
+                <a:solidFill>
+                  <a:srgbClr val="FFFFFF"/>
+                </a:solidFill>
+              </a14:hiddenFill>
+            </a:ext>
+          </a:extLst>
+        </p:spPr>
+      </p:pic>
+      <p:pic>
+        <p:nvPicPr>
+          <p:cNvPr id="1034" name="Picture 10" descr="Go (programming language) - Wikipedia">
+            <a:extLst>
+              <a:ext uri="{FF2B5EF4-FFF2-40B4-BE49-F238E27FC236}">
+                <a16:creationId xmlns:a16="http://schemas.microsoft.com/office/drawing/2014/main" id="{A5F5903A-8D87-4391-8125-B83C25E0BCA0}"/>
+              </a:ext>
+            </a:extLst>
+          </p:cNvPr>
+          <p:cNvPicPr>
+            <a:picLocks noChangeAspect="1" noChangeArrowheads="1"/>
+          </p:cNvPicPr>
+          <p:nvPr/>
+        </p:nvPicPr>
+        <p:blipFill>
+          <a:blip r:embed="rId6">
+            <a:extLst>
+              <a:ext uri="{28A0092B-C50C-407E-A947-70E740481C1C}">
+                <a14:useLocalDpi xmlns:a14="http://schemas.microsoft.com/office/drawing/2010/main" val="0"/>
+              </a:ext>
+            </a:extLst>
+          </a:blip>
+          <a:srcRect/>
+          <a:stretch>
+            <a:fillRect/>
+          </a:stretch>
+        </p:blipFill>
+        <p:spPr bwMode="auto">
+          <a:xfrm>
+            <a:off x="6244778" y="1051197"/>
+            <a:ext cx="611080" cy="229664"/>
+          </a:xfrm>
+          <a:prstGeom prst="rect">
+            <a:avLst/>
+          </a:prstGeom>
+          <a:noFill/>
+          <a:extLst>
+            <a:ext uri="{909E8E84-426E-40DD-AFC4-6F175D3DCCD1}">
+              <a14:hiddenFill xmlns:a14="http://schemas.microsoft.com/office/drawing/2010/main">
+                <a:solidFill>
+                  <a:srgbClr val="FFFFFF"/>
+                </a:solidFill>
+              </a14:hiddenFill>
+            </a:ext>
+          </a:extLst>
+        </p:spPr>
+      </p:pic>
+      <p:pic>
+        <p:nvPicPr>
+          <p:cNvPr id="66" name="Picture 10" descr="Go (programming language) - Wikipedia">
+            <a:extLst>
+              <a:ext uri="{FF2B5EF4-FFF2-40B4-BE49-F238E27FC236}">
+                <a16:creationId xmlns:a16="http://schemas.microsoft.com/office/drawing/2014/main" id="{38033268-6CE2-44FA-AD47-0292908BC084}"/>
+              </a:ext>
+            </a:extLst>
+          </p:cNvPr>
+          <p:cNvPicPr>
+            <a:picLocks noChangeAspect="1" noChangeArrowheads="1"/>
+          </p:cNvPicPr>
+          <p:nvPr/>
+        </p:nvPicPr>
+        <p:blipFill>
+          <a:blip r:embed="rId6">
+            <a:extLst>
+              <a:ext uri="{28A0092B-C50C-407E-A947-70E740481C1C}">
+                <a14:useLocalDpi xmlns:a14="http://schemas.microsoft.com/office/drawing/2010/main" val="0"/>
+              </a:ext>
+            </a:extLst>
+          </a:blip>
+          <a:srcRect/>
+          <a:stretch>
+            <a:fillRect/>
+          </a:stretch>
+        </p:blipFill>
+        <p:spPr bwMode="auto">
+          <a:xfrm>
+            <a:off x="6242660" y="3246426"/>
+            <a:ext cx="611080" cy="229664"/>
+          </a:xfrm>
+          <a:prstGeom prst="rect">
+            <a:avLst/>
+          </a:prstGeom>
+          <a:noFill/>
+          <a:extLst>
+            <a:ext uri="{909E8E84-426E-40DD-AFC4-6F175D3DCCD1}">
+              <a14:hiddenFill xmlns:a14="http://schemas.microsoft.com/office/drawing/2010/main">
+                <a:solidFill>
+                  <a:srgbClr val="FFFFFF"/>
+                </a:solidFill>
+              </a14:hiddenFill>
+            </a:ext>
+          </a:extLst>
+        </p:spPr>
+      </p:pic>
+      <p:pic>
+        <p:nvPicPr>
+          <p:cNvPr id="67" name="Picture 10" descr="Go (programming language) - Wikipedia">
+            <a:extLst>
+              <a:ext uri="{FF2B5EF4-FFF2-40B4-BE49-F238E27FC236}">
+                <a16:creationId xmlns:a16="http://schemas.microsoft.com/office/drawing/2014/main" id="{6863EB53-C729-4032-BBA9-FDD1E73CB7C2}"/>
+              </a:ext>
+            </a:extLst>
+          </p:cNvPr>
+          <p:cNvPicPr>
+            <a:picLocks noChangeAspect="1" noChangeArrowheads="1"/>
+          </p:cNvPicPr>
+          <p:nvPr/>
+        </p:nvPicPr>
+        <p:blipFill>
+          <a:blip r:embed="rId6">
+            <a:extLst>
+              <a:ext uri="{28A0092B-C50C-407E-A947-70E740481C1C}">
+                <a14:useLocalDpi xmlns:a14="http://schemas.microsoft.com/office/drawing/2010/main" val="0"/>
+              </a:ext>
+            </a:extLst>
+          </a:blip>
+          <a:srcRect/>
+          <a:stretch>
+            <a:fillRect/>
+          </a:stretch>
+        </p:blipFill>
+        <p:spPr bwMode="auto">
+          <a:xfrm>
+            <a:off x="6242660" y="4433387"/>
+            <a:ext cx="611080" cy="229664"/>
+          </a:xfrm>
+          <a:prstGeom prst="rect">
+            <a:avLst/>
+          </a:prstGeom>
+          <a:noFill/>
+          <a:extLst>
+            <a:ext uri="{909E8E84-426E-40DD-AFC4-6F175D3DCCD1}">
+              <a14:hiddenFill xmlns:a14="http://schemas.microsoft.com/office/drawing/2010/main">
+                <a:solidFill>
+                  <a:srgbClr val="FFFFFF"/>
+                </a:solidFill>
+              </a14:hiddenFill>
+            </a:ext>
+          </a:extLst>
+        </p:spPr>
+      </p:pic>
+      <p:pic>
+        <p:nvPicPr>
+          <p:cNvPr id="69" name="Picture 10" descr="Go (programming language) - Wikipedia">
+            <a:extLst>
+              <a:ext uri="{FF2B5EF4-FFF2-40B4-BE49-F238E27FC236}">
+                <a16:creationId xmlns:a16="http://schemas.microsoft.com/office/drawing/2014/main" id="{405FF19A-B70E-4CCB-AEA6-0A5CF6BF0E31}"/>
+              </a:ext>
+            </a:extLst>
+          </p:cNvPr>
+          <p:cNvPicPr>
+            <a:picLocks noChangeAspect="1" noChangeArrowheads="1"/>
+          </p:cNvPicPr>
+          <p:nvPr/>
+        </p:nvPicPr>
+        <p:blipFill>
+          <a:blip r:embed="rId6">
+            <a:extLst>
+              <a:ext uri="{28A0092B-C50C-407E-A947-70E740481C1C}">
+                <a14:useLocalDpi xmlns:a14="http://schemas.microsoft.com/office/drawing/2010/main" val="0"/>
+              </a:ext>
+            </a:extLst>
+          </a:blip>
+          <a:srcRect/>
+          <a:stretch>
+            <a:fillRect/>
+          </a:stretch>
+        </p:blipFill>
+        <p:spPr bwMode="auto">
+          <a:xfrm>
+            <a:off x="6242660" y="5538184"/>
+            <a:ext cx="611080" cy="229664"/>
+          </a:xfrm>
+          <a:prstGeom prst="rect">
+            <a:avLst/>
+          </a:prstGeom>
+          <a:noFill/>
+          <a:extLst>
+            <a:ext uri="{909E8E84-426E-40DD-AFC4-6F175D3DCCD1}">
+              <a14:hiddenFill xmlns:a14="http://schemas.microsoft.com/office/drawing/2010/main">
+                <a:solidFill>
+                  <a:srgbClr val="FFFFFF"/>
+                </a:solidFill>
+              </a14:hiddenFill>
+            </a:ext>
+          </a:extLst>
+        </p:spPr>
+      </p:pic>
+      <p:pic>
+        <p:nvPicPr>
+          <p:cNvPr id="1038" name="Picture 14" descr="How to integrate Mixpanel into a Spring Boot application | by Marian Furdui  | Medium">
+            <a:extLst>
+              <a:ext uri="{FF2B5EF4-FFF2-40B4-BE49-F238E27FC236}">
+                <a16:creationId xmlns:a16="http://schemas.microsoft.com/office/drawing/2014/main" id="{7EC2F1F4-92A3-4B14-BEF1-F0D370B2F611}"/>
+              </a:ext>
+            </a:extLst>
+          </p:cNvPr>
+          <p:cNvPicPr>
+            <a:picLocks noChangeAspect="1" noChangeArrowheads="1"/>
+          </p:cNvPicPr>
+          <p:nvPr/>
+        </p:nvPicPr>
+        <p:blipFill>
+          <a:blip r:embed="rId7">
+            <a:extLst>
+              <a:ext uri="{28A0092B-C50C-407E-A947-70E740481C1C}">
+                <a14:useLocalDpi xmlns:a14="http://schemas.microsoft.com/office/drawing/2010/main" val="0"/>
+              </a:ext>
+            </a:extLst>
+          </a:blip>
+          <a:srcRect/>
+          <a:stretch>
+            <a:fillRect/>
+          </a:stretch>
+        </p:blipFill>
+        <p:spPr bwMode="auto">
+          <a:xfrm>
+            <a:off x="6465444" y="2110487"/>
+            <a:ext cx="326059" cy="292539"/>
+          </a:xfrm>
+          <a:prstGeom prst="rect">
+            <a:avLst/>
+          </a:prstGeom>
+          <a:noFill/>
+          <a:extLst>
+            <a:ext uri="{909E8E84-426E-40DD-AFC4-6F175D3DCCD1}">
+              <a14:hiddenFill xmlns:a14="http://schemas.microsoft.com/office/drawing/2010/main">
+                <a:solidFill>
+                  <a:srgbClr val="FFFFFF"/>
+                </a:solidFill>
+              </a14:hiddenFill>
+            </a:ext>
+          </a:extLst>
+        </p:spPr>
+      </p:pic>
+      <p:pic>
+        <p:nvPicPr>
+          <p:cNvPr id="1040" name="Picture 16">
+            <a:extLst>
+              <a:ext uri="{FF2B5EF4-FFF2-40B4-BE49-F238E27FC236}">
+                <a16:creationId xmlns:a16="http://schemas.microsoft.com/office/drawing/2014/main" id="{39E1C120-4217-4C53-A754-3D374CC80A01}"/>
+              </a:ext>
+            </a:extLst>
+          </p:cNvPr>
+          <p:cNvPicPr>
+            <a:picLocks noChangeAspect="1" noChangeArrowheads="1"/>
+          </p:cNvPicPr>
+          <p:nvPr/>
+        </p:nvPicPr>
+        <p:blipFill>
+          <a:blip r:embed="rId8">
+            <a:extLst>
+              <a:ext uri="{28A0092B-C50C-407E-A947-70E740481C1C}">
+                <a14:useLocalDpi xmlns:a14="http://schemas.microsoft.com/office/drawing/2010/main" val="0"/>
+              </a:ext>
+            </a:extLst>
+          </a:blip>
+          <a:srcRect/>
+          <a:stretch>
+            <a:fillRect/>
+          </a:stretch>
+        </p:blipFill>
+        <p:spPr bwMode="auto">
+          <a:xfrm>
+            <a:off x="3455244" y="3238500"/>
+            <a:ext cx="957713" cy="299454"/>
+          </a:xfrm>
+          <a:prstGeom prst="rect">
+            <a:avLst/>
+          </a:prstGeom>
+          <a:noFill/>
+          <a:extLst>
+            <a:ext uri="{909E8E84-426E-40DD-AFC4-6F175D3DCCD1}">
+              <a14:hiddenFill xmlns:a14="http://schemas.microsoft.com/office/drawing/2010/main">
+                <a:solidFill>
+                  <a:srgbClr val="FFFFFF"/>
+                </a:solidFill>
+              </a14:hiddenFill>
+            </a:ext>
+          </a:extLst>
+        </p:spPr>
+      </p:pic>
     </p:spTree>
     <p:extLst>
       <p:ext uri="{BB962C8B-B14F-4D97-AF65-F5344CB8AC3E}">
@@ -5119,4 +6448,299 @@
     </a:ext>
   </a:extLst>
 </a:theme>
+</file>
+
+<file path=ppt/theme/theme2.xml><?xml version="1.0" encoding="utf-8"?>
+<a:theme xmlns:a="http://schemas.openxmlformats.org/drawingml/2006/main" name="Office Theme">
+  <a:themeElements>
+    <a:clrScheme name="Office">
+      <a:dk1>
+        <a:sysClr val="windowText" lastClr="000000"/>
+      </a:dk1>
+      <a:lt1>
+        <a:sysClr val="window" lastClr="FFFFFF"/>
+      </a:lt1>
+      <a:dk2>
+        <a:srgbClr val="44546A"/>
+      </a:dk2>
+      <a:lt2>
+        <a:srgbClr val="E7E6E6"/>
+      </a:lt2>
+      <a:accent1>
+        <a:srgbClr val="4472C4"/>
+      </a:accent1>
+      <a:accent2>
+        <a:srgbClr val="ED7D31"/>
+      </a:accent2>
+      <a:accent3>
+        <a:srgbClr val="A5A5A5"/>
+      </a:accent3>
+      <a:accent4>
+        <a:srgbClr val="FFC000"/>
+      </a:accent4>
+      <a:accent5>
+        <a:srgbClr val="5B9BD5"/>
+      </a:accent5>
+      <a:accent6>
+        <a:srgbClr val="70AD47"/>
+      </a:accent6>
+      <a:hlink>
+        <a:srgbClr val="0563C1"/>
+      </a:hlink>
+      <a:folHlink>
+        <a:srgbClr val="954F72"/>
+      </a:folHlink>
+    </a:clrScheme>
+    <a:fontScheme name="Office">
+      <a:majorFont>
+        <a:latin typeface="Calibri Light" panose="020F0302020204030204"/>
+        <a:ea typeface=""/>
+        <a:cs typeface=""/>
+        <a:font script="Jpan" typeface="游ゴシック Light"/>
+        <a:font script="Hang" typeface="맑은 고딕"/>
+        <a:font script="Hans" typeface="等线 Light"/>
+        <a:font script="Hant" typeface="新細明體"/>
+        <a:font script="Arab" typeface="Times New Roman"/>
+        <a:font script="Hebr" typeface="Times New Roman"/>
+        <a:font script="Thai" typeface="Angsana New"/>
+        <a:font script="Ethi" typeface="Nyala"/>
+        <a:font script="Beng" typeface="Vrinda"/>
+        <a:font script="Gujr" typeface="Shruti"/>
+        <a:font script="Khmr" typeface="MoolBoran"/>
+        <a:font script="Knda" typeface="Tunga"/>
+        <a:font script="Guru" typeface="Raavi"/>
+        <a:font script="Cans" typeface="Euphemia"/>
+        <a:font script="Cher" typeface="Plantagenet Cherokee"/>
+        <a:font script="Yiii" typeface="Microsoft Yi Baiti"/>
+        <a:font script="Tibt" typeface="Microsoft Himalaya"/>
+        <a:font script="Thaa" typeface="MV Boli"/>
+        <a:font script="Deva" typeface="Mangal"/>
+        <a:font script="Telu" typeface="Gautami"/>
+        <a:font script="Taml" typeface="Latha"/>
+        <a:font script="Syrc" typeface="Estrangelo Edessa"/>
+        <a:font script="Orya" typeface="Kalinga"/>
+        <a:font script="Mlym" typeface="Kartika"/>
+        <a:font script="Laoo" typeface="DokChampa"/>
+        <a:font script="Sinh" typeface="Iskoola Pota"/>
+        <a:font script="Mong" typeface="Mongolian Baiti"/>
+        <a:font script="Viet" typeface="Times New Roman"/>
+        <a:font script="Uigh" typeface="Microsoft Uighur"/>
+        <a:font script="Geor" typeface="Sylfaen"/>
+        <a:font script="Armn" typeface="Arial"/>
+        <a:font script="Bugi" typeface="Leelawadee UI"/>
+        <a:font script="Bopo" typeface="Microsoft JhengHei"/>
+        <a:font script="Java" typeface="Javanese Text"/>
+        <a:font script="Lisu" typeface="Segoe UI"/>
+        <a:font script="Mymr" typeface="Myanmar Text"/>
+        <a:font script="Nkoo" typeface="Ebrima"/>
+        <a:font script="Olck" typeface="Nirmala UI"/>
+        <a:font script="Osma" typeface="Ebrima"/>
+        <a:font script="Phag" typeface="Phagspa"/>
+        <a:font script="Syrn" typeface="Estrangelo Edessa"/>
+        <a:font script="Syrj" typeface="Estrangelo Edessa"/>
+        <a:font script="Syre" typeface="Estrangelo Edessa"/>
+        <a:font script="Sora" typeface="Nirmala UI"/>
+        <a:font script="Tale" typeface="Microsoft Tai Le"/>
+        <a:font script="Talu" typeface="Microsoft New Tai Lue"/>
+        <a:font script="Tfng" typeface="Ebrima"/>
+      </a:majorFont>
+      <a:minorFont>
+        <a:latin typeface="Calibri" panose="020F0502020204030204"/>
+        <a:ea typeface=""/>
+        <a:cs typeface=""/>
+        <a:font script="Jpan" typeface="游ゴシック"/>
+        <a:font script="Hang" typeface="맑은 고딕"/>
+        <a:font script="Hans" typeface="等线"/>
+        <a:font script="Hant" typeface="新細明體"/>
+        <a:font script="Arab" typeface="Arial"/>
+        <a:font script="Hebr" typeface="Arial"/>
+        <a:font script="Thai" typeface="Cordia New"/>
+        <a:font script="Ethi" typeface="Nyala"/>
+        <a:font script="Beng" typeface="Vrinda"/>
+        <a:font script="Gujr" typeface="Shruti"/>
+        <a:font script="Khmr" typeface="DaunPenh"/>
+        <a:font script="Knda" typeface="Tunga"/>
+        <a:font script="Guru" typeface="Raavi"/>
+        <a:font script="Cans" typeface="Euphemia"/>
+        <a:font script="Cher" typeface="Plantagenet Cherokee"/>
+        <a:font script="Yiii" typeface="Microsoft Yi Baiti"/>
+        <a:font script="Tibt" typeface="Microsoft Himalaya"/>
+        <a:font script="Thaa" typeface="MV Boli"/>
+        <a:font script="Deva" typeface="Mangal"/>
+        <a:font script="Telu" typeface="Gautami"/>
+        <a:font script="Taml" typeface="Latha"/>
+        <a:font script="Syrc" typeface="Estrangelo Edessa"/>
+        <a:font script="Orya" typeface="Kalinga"/>
+        <a:font script="Mlym" typeface="Kartika"/>
+        <a:font script="Laoo" typeface="DokChampa"/>
+        <a:font script="Sinh" typeface="Iskoola Pota"/>
+        <a:font script="Mong" typeface="Mongolian Baiti"/>
+        <a:font script="Viet" typeface="Arial"/>
+        <a:font script="Uigh" typeface="Microsoft Uighur"/>
+        <a:font script="Geor" typeface="Sylfaen"/>
+        <a:font script="Armn" typeface="Arial"/>
+        <a:font script="Bugi" typeface="Leelawadee UI"/>
+        <a:font script="Bopo" typeface="Microsoft JhengHei"/>
+        <a:font script="Java" typeface="Javanese Text"/>
+        <a:font script="Lisu" typeface="Segoe UI"/>
+        <a:font script="Mymr" typeface="Myanmar Text"/>
+        <a:font script="Nkoo" typeface="Ebrima"/>
+        <a:font script="Olck" typeface="Nirmala UI"/>
+        <a:font script="Osma" typeface="Ebrima"/>
+        <a:font script="Phag" typeface="Phagspa"/>
+        <a:font script="Syrn" typeface="Estrangelo Edessa"/>
+        <a:font script="Syrj" typeface="Estrangelo Edessa"/>
+        <a:font script="Syre" typeface="Estrangelo Edessa"/>
+        <a:font script="Sora" typeface="Nirmala UI"/>
+        <a:font script="Tale" typeface="Microsoft Tai Le"/>
+        <a:font script="Talu" typeface="Microsoft New Tai Lue"/>
+        <a:font script="Tfng" typeface="Ebrima"/>
+      </a:minorFont>
+    </a:fontScheme>
+    <a:fmtScheme name="Office">
+      <a:fillStyleLst>
+        <a:solidFill>
+          <a:schemeClr val="phClr"/>
+        </a:solidFill>
+        <a:gradFill rotWithShape="1">
+          <a:gsLst>
+            <a:gs pos="0">
+              <a:schemeClr val="phClr">
+                <a:lumMod val="110000"/>
+                <a:satMod val="105000"/>
+                <a:tint val="67000"/>
+              </a:schemeClr>
+            </a:gs>
+            <a:gs pos="50000">
+              <a:schemeClr val="phClr">
+                <a:lumMod val="105000"/>
+                <a:satMod val="103000"/>
+                <a:tint val="73000"/>
+              </a:schemeClr>
+            </a:gs>
+            <a:gs pos="100000">
+              <a:schemeClr val="phClr">
+                <a:lumMod val="105000"/>
+                <a:satMod val="109000"/>
+                <a:tint val="81000"/>
+              </a:schemeClr>
+            </a:gs>
+          </a:gsLst>
+          <a:lin ang="5400000" scaled="0"/>
+        </a:gradFill>
+        <a:gradFill rotWithShape="1">
+          <a:gsLst>
+            <a:gs pos="0">
+              <a:schemeClr val="phClr">
+                <a:satMod val="103000"/>
+                <a:lumMod val="102000"/>
+                <a:tint val="94000"/>
+              </a:schemeClr>
+            </a:gs>
+            <a:gs pos="50000">
+              <a:schemeClr val="phClr">
+                <a:satMod val="110000"/>
+                <a:lumMod val="100000"/>
+                <a:shade val="100000"/>
+              </a:schemeClr>
+            </a:gs>
+            <a:gs pos="100000">
+              <a:schemeClr val="phClr">
+                <a:lumMod val="99000"/>
+                <a:satMod val="120000"/>
+                <a:shade val="78000"/>
+              </a:schemeClr>
+            </a:gs>
+          </a:gsLst>
+          <a:lin ang="5400000" scaled="0"/>
+        </a:gradFill>
+      </a:fillStyleLst>
+      <a:lnStyleLst>
+        <a:ln w="6350" cap="flat" cmpd="sng" algn="ctr">
+          <a:solidFill>
+            <a:schemeClr val="phClr"/>
+          </a:solidFill>
+          <a:prstDash val="solid"/>
+          <a:miter lim="800000"/>
+        </a:ln>
+        <a:ln w="12700" cap="flat" cmpd="sng" algn="ctr">
+          <a:solidFill>
+            <a:schemeClr val="phClr"/>
+          </a:solidFill>
+          <a:prstDash val="solid"/>
+          <a:miter lim="800000"/>
+        </a:ln>
+        <a:ln w="19050" cap="flat" cmpd="sng" algn="ctr">
+          <a:solidFill>
+            <a:schemeClr val="phClr"/>
+          </a:solidFill>
+          <a:prstDash val="solid"/>
+          <a:miter lim="800000"/>
+        </a:ln>
+      </a:lnStyleLst>
+      <a:effectStyleLst>
+        <a:effectStyle>
+          <a:effectLst/>
+        </a:effectStyle>
+        <a:effectStyle>
+          <a:effectLst/>
+        </a:effectStyle>
+        <a:effectStyle>
+          <a:effectLst>
+            <a:outerShdw blurRad="57150" dist="19050" dir="5400000" algn="ctr" rotWithShape="0">
+              <a:srgbClr val="000000">
+                <a:alpha val="63000"/>
+              </a:srgbClr>
+            </a:outerShdw>
+          </a:effectLst>
+        </a:effectStyle>
+      </a:effectStyleLst>
+      <a:bgFillStyleLst>
+        <a:solidFill>
+          <a:schemeClr val="phClr"/>
+        </a:solidFill>
+        <a:solidFill>
+          <a:schemeClr val="phClr">
+            <a:tint val="95000"/>
+            <a:satMod val="170000"/>
+          </a:schemeClr>
+        </a:solidFill>
+        <a:gradFill rotWithShape="1">
+          <a:gsLst>
+            <a:gs pos="0">
+              <a:schemeClr val="phClr">
+                <a:tint val="93000"/>
+                <a:satMod val="150000"/>
+                <a:shade val="98000"/>
+                <a:lumMod val="102000"/>
+              </a:schemeClr>
+            </a:gs>
+            <a:gs pos="50000">
+              <a:schemeClr val="phClr">
+                <a:tint val="98000"/>
+                <a:satMod val="130000"/>
+                <a:shade val="90000"/>
+                <a:lumMod val="103000"/>
+              </a:schemeClr>
+            </a:gs>
+            <a:gs pos="100000">
+              <a:schemeClr val="phClr">
+                <a:shade val="63000"/>
+                <a:satMod val="120000"/>
+              </a:schemeClr>
+            </a:gs>
+          </a:gsLst>
+          <a:lin ang="5400000" scaled="0"/>
+        </a:gradFill>
+      </a:bgFillStyleLst>
+    </a:fmtScheme>
+  </a:themeElements>
+  <a:objectDefaults/>
+  <a:extraClrSchemeLst/>
+  <a:extLst>
+    <a:ext uri="{05A4C25C-085E-4340-85A3-A5531E510DB2}">
+      <thm15:themeFamily xmlns:thm15="http://schemas.microsoft.com/office/thememl/2012/main" name="Office Theme" id="{62F939B6-93AF-4DB8-9C6B-D6C7DFDC589F}" vid="{4A3C46E8-61CC-4603-A589-7422A47A8E4A}"/>
+    </a:ext>
+  </a:extLst>
+</a:theme>
 </file>
</xml_diff>